<commit_message>
Add grading criteria and update session 8 documents.
</commit_message>
<xml_diff>
--- a/CPSC-24700/Presentations/css.pptx
+++ b/CPSC-24700/Presentations/css.pptx
@@ -6,7 +6,7 @@
     <p:sldMasterId id="2147483672" r:id="rId2"/>
   </p:sldMasterIdLst>
   <p:notesMasterIdLst>
-    <p:notesMasterId r:id="rId58"/>
+    <p:notesMasterId r:id="rId60"/>
   </p:notesMasterIdLst>
   <p:sldIdLst>
     <p:sldId id="298" r:id="rId3"/>
@@ -24,46 +24,48 @@
     <p:sldId id="303" r:id="rId15"/>
     <p:sldId id="304" r:id="rId16"/>
     <p:sldId id="266" r:id="rId17"/>
-    <p:sldId id="267" r:id="rId18"/>
-    <p:sldId id="268" r:id="rId19"/>
-    <p:sldId id="269" r:id="rId20"/>
-    <p:sldId id="270" r:id="rId21"/>
-    <p:sldId id="271" r:id="rId22"/>
-    <p:sldId id="306" r:id="rId23"/>
-    <p:sldId id="307" r:id="rId24"/>
-    <p:sldId id="272" r:id="rId25"/>
-    <p:sldId id="273" r:id="rId26"/>
-    <p:sldId id="308" r:id="rId27"/>
-    <p:sldId id="274" r:id="rId28"/>
-    <p:sldId id="309" r:id="rId29"/>
-    <p:sldId id="275" r:id="rId30"/>
-    <p:sldId id="276" r:id="rId31"/>
-    <p:sldId id="277" r:id="rId32"/>
-    <p:sldId id="302" r:id="rId33"/>
-    <p:sldId id="310" r:id="rId34"/>
-    <p:sldId id="279" r:id="rId35"/>
-    <p:sldId id="280" r:id="rId36"/>
-    <p:sldId id="317" r:id="rId37"/>
-    <p:sldId id="282" r:id="rId38"/>
-    <p:sldId id="281" r:id="rId39"/>
-    <p:sldId id="311" r:id="rId40"/>
-    <p:sldId id="284" r:id="rId41"/>
-    <p:sldId id="315" r:id="rId42"/>
-    <p:sldId id="285" r:id="rId43"/>
-    <p:sldId id="318" r:id="rId44"/>
-    <p:sldId id="313" r:id="rId45"/>
-    <p:sldId id="287" r:id="rId46"/>
-    <p:sldId id="288" r:id="rId47"/>
-    <p:sldId id="319" r:id="rId48"/>
-    <p:sldId id="314" r:id="rId49"/>
-    <p:sldId id="289" r:id="rId50"/>
-    <p:sldId id="290" r:id="rId51"/>
-    <p:sldId id="312" r:id="rId52"/>
-    <p:sldId id="291" r:id="rId53"/>
-    <p:sldId id="292" r:id="rId54"/>
-    <p:sldId id="293" r:id="rId55"/>
-    <p:sldId id="316" r:id="rId56"/>
-    <p:sldId id="297" r:id="rId57"/>
+    <p:sldId id="320" r:id="rId18"/>
+    <p:sldId id="267" r:id="rId19"/>
+    <p:sldId id="268" r:id="rId20"/>
+    <p:sldId id="269" r:id="rId21"/>
+    <p:sldId id="270" r:id="rId22"/>
+    <p:sldId id="271" r:id="rId23"/>
+    <p:sldId id="306" r:id="rId24"/>
+    <p:sldId id="307" r:id="rId25"/>
+    <p:sldId id="272" r:id="rId26"/>
+    <p:sldId id="273" r:id="rId27"/>
+    <p:sldId id="308" r:id="rId28"/>
+    <p:sldId id="274" r:id="rId29"/>
+    <p:sldId id="309" r:id="rId30"/>
+    <p:sldId id="275" r:id="rId31"/>
+    <p:sldId id="276" r:id="rId32"/>
+    <p:sldId id="277" r:id="rId33"/>
+    <p:sldId id="321" r:id="rId34"/>
+    <p:sldId id="302" r:id="rId35"/>
+    <p:sldId id="310" r:id="rId36"/>
+    <p:sldId id="279" r:id="rId37"/>
+    <p:sldId id="280" r:id="rId38"/>
+    <p:sldId id="317" r:id="rId39"/>
+    <p:sldId id="282" r:id="rId40"/>
+    <p:sldId id="281" r:id="rId41"/>
+    <p:sldId id="311" r:id="rId42"/>
+    <p:sldId id="284" r:id="rId43"/>
+    <p:sldId id="315" r:id="rId44"/>
+    <p:sldId id="285" r:id="rId45"/>
+    <p:sldId id="318" r:id="rId46"/>
+    <p:sldId id="313" r:id="rId47"/>
+    <p:sldId id="287" r:id="rId48"/>
+    <p:sldId id="288" r:id="rId49"/>
+    <p:sldId id="319" r:id="rId50"/>
+    <p:sldId id="314" r:id="rId51"/>
+    <p:sldId id="289" r:id="rId52"/>
+    <p:sldId id="290" r:id="rId53"/>
+    <p:sldId id="312" r:id="rId54"/>
+    <p:sldId id="291" r:id="rId55"/>
+    <p:sldId id="292" r:id="rId56"/>
+    <p:sldId id="293" r:id="rId57"/>
+    <p:sldId id="316" r:id="rId58"/>
+    <p:sldId id="297" r:id="rId59"/>
   </p:sldIdLst>
   <p:sldSz cx="9144000" cy="6858000" type="screen4x3"/>
   <p:notesSz cx="6858000" cy="9144000"/>
@@ -267,7 +269,7 @@
           <a:p>
             <a:fld id="{82AC26F5-A2E7-4901-A403-BBD25C17198C}" type="datetimeFigureOut">
               <a:rPr lang="en-US" smtClean="0"/>
-              <a:t>9/13/2017</a:t>
+              <a:t>9/14/2017</a:t>
             </a:fld>
             <a:endParaRPr lang="en-US"/>
           </a:p>
@@ -1004,6 +1006,111 @@
             </a:r>
           </a:p>
           <a:p>
+            <a:r>
+              <a:rPr lang="en-US" dirty="0"/>
+              <a:t>https://www.w3schools.com/cssref/</a:t>
+            </a:r>
+          </a:p>
+          <a:p>
+            <a:r>
+              <a:rPr lang="en-US" dirty="0"/>
+              <a:t>https://www.w3schools.com/cssref/pr_font_font.asp</a:t>
+            </a:r>
+          </a:p>
+          <a:p>
+            <a:r>
+              <a:rPr lang="en-US" dirty="0"/>
+              <a:t>https://www.w3schools.com/cssref/tryit.asp?filename=trycss_font</a:t>
+            </a:r>
+          </a:p>
+        </p:txBody>
+      </p:sp>
+      <p:sp>
+        <p:nvSpPr>
+          <p:cNvPr id="4" name="Slide Number Placeholder 3"/>
+          <p:cNvSpPr>
+            <a:spLocks noGrp="1"/>
+          </p:cNvSpPr>
+          <p:nvPr>
+            <p:ph type="sldNum" sz="quarter" idx="10"/>
+          </p:nvPr>
+        </p:nvSpPr>
+        <p:spPr/>
+        <p:txBody>
+          <a:bodyPr/>
+          <a:lstStyle/>
+          <a:p>
+            <a:fld id="{40F5A9F4-14AB-4E34-9372-28158D5523BB}" type="slidenum">
+              <a:rPr lang="en-US" smtClean="0"/>
+              <a:t>32</a:t>
+            </a:fld>
+            <a:endParaRPr lang="en-US"/>
+          </a:p>
+        </p:txBody>
+      </p:sp>
+    </p:spTree>
+    <p:extLst>
+      <p:ext uri="{BB962C8B-B14F-4D97-AF65-F5344CB8AC3E}">
+        <p14:creationId xmlns:p14="http://schemas.microsoft.com/office/powerpoint/2010/main" val="2517327132"/>
+      </p:ext>
+    </p:extLst>
+  </p:cSld>
+  <p:clrMapOvr>
+    <a:masterClrMapping/>
+  </p:clrMapOvr>
+</p:notes>
+</file>
+
+<file path=ppt/notesSlides/notesSlide16.xml><?xml version="1.0" encoding="utf-8"?>
+<p:notes xmlns:a="http://schemas.openxmlformats.org/drawingml/2006/main" xmlns:r="http://schemas.openxmlformats.org/officeDocument/2006/relationships" xmlns:p="http://schemas.openxmlformats.org/presentationml/2006/main">
+  <p:cSld>
+    <p:spTree>
+      <p:nvGrpSpPr>
+        <p:cNvPr id="1" name=""/>
+        <p:cNvGrpSpPr/>
+        <p:nvPr/>
+      </p:nvGrpSpPr>
+      <p:grpSpPr>
+        <a:xfrm>
+          <a:off x="0" y="0"/>
+          <a:ext cx="0" cy="0"/>
+          <a:chOff x="0" y="0"/>
+          <a:chExt cx="0" cy="0"/>
+        </a:xfrm>
+      </p:grpSpPr>
+      <p:sp>
+        <p:nvSpPr>
+          <p:cNvPr id="2" name="Slide Image Placeholder 1"/>
+          <p:cNvSpPr>
+            <a:spLocks noGrp="1" noRot="1" noChangeAspect="1"/>
+          </p:cNvSpPr>
+          <p:nvPr>
+            <p:ph type="sldImg"/>
+          </p:nvPr>
+        </p:nvSpPr>
+        <p:spPr/>
+      </p:sp>
+      <p:sp>
+        <p:nvSpPr>
+          <p:cNvPr id="3" name="Notes Placeholder 2"/>
+          <p:cNvSpPr>
+            <a:spLocks noGrp="1"/>
+          </p:cNvSpPr>
+          <p:nvPr>
+            <p:ph type="body" idx="1"/>
+          </p:nvPr>
+        </p:nvSpPr>
+        <p:spPr/>
+        <p:txBody>
+          <a:bodyPr/>
+          <a:lstStyle/>
+          <a:p>
+            <a:r>
+              <a:rPr lang="en-US" dirty="0"/>
+              <a:t>Links:</a:t>
+            </a:r>
+          </a:p>
+          <a:p>
             <a:pPr marL="0" marR="0" lvl="0" indent="0" algn="l" defTabSz="914400" rtl="0" eaLnBrk="1" fontAlgn="auto" latinLnBrk="0" hangingPunct="1">
               <a:lnSpc>
                 <a:spcPct val="100000"/>
@@ -1168,7 +1275,7 @@
           <a:p>
             <a:fld id="{40F5A9F4-14AB-4E34-9372-28158D5523BB}" type="slidenum">
               <a:rPr lang="en-US" smtClean="0"/>
-              <a:t>31</a:t>
+              <a:t>33</a:t>
             </a:fld>
             <a:endParaRPr lang="en-US"/>
           </a:p>
@@ -1187,7 +1294,7 @@
 </p:notes>
 </file>
 
-<file path=ppt/notesSlides/notesSlide16.xml><?xml version="1.0" encoding="utf-8"?>
+<file path=ppt/notesSlides/notesSlide17.xml><?xml version="1.0" encoding="utf-8"?>
 <p:notes xmlns:a="http://schemas.openxmlformats.org/drawingml/2006/main" xmlns:r="http://schemas.openxmlformats.org/officeDocument/2006/relationships" xmlns:p="http://schemas.openxmlformats.org/presentationml/2006/main">
   <p:cSld>
     <p:spTree>
@@ -1257,7 +1364,7 @@
 </p:notes>
 </file>
 
-<file path=ppt/notesSlides/notesSlide17.xml><?xml version="1.0" encoding="utf-8"?>
+<file path=ppt/notesSlides/notesSlide18.xml><?xml version="1.0" encoding="utf-8"?>
 <p:notes xmlns:a="http://schemas.openxmlformats.org/drawingml/2006/main" xmlns:r="http://schemas.openxmlformats.org/officeDocument/2006/relationships" xmlns:p="http://schemas.openxmlformats.org/presentationml/2006/main">
   <p:cSld>
     <p:spTree>
@@ -1359,7 +1466,7 @@
           <a:p>
             <a:fld id="{40F5A9F4-14AB-4E34-9372-28158D5523BB}" type="slidenum">
               <a:rPr lang="en-US" smtClean="0"/>
-              <a:t>35</a:t>
+              <a:t>37</a:t>
             </a:fld>
             <a:endParaRPr lang="en-US"/>
           </a:p>
@@ -1378,7 +1485,7 @@
 </p:notes>
 </file>
 
-<file path=ppt/notesSlides/notesSlide18.xml><?xml version="1.0" encoding="utf-8"?>
+<file path=ppt/notesSlides/notesSlide19.xml><?xml version="1.0" encoding="utf-8"?>
 <p:notes xmlns:a="http://schemas.openxmlformats.org/drawingml/2006/main" xmlns:r="http://schemas.openxmlformats.org/officeDocument/2006/relationships" xmlns:p="http://schemas.openxmlformats.org/presentationml/2006/main">
   <p:cSld>
     <p:spTree>
@@ -1437,76 +1544,6 @@
           <a:lstStyle/>
           <a:p>
             <a:endParaRPr lang="en-US" dirty="0"/>
-          </a:p>
-        </p:txBody>
-      </p:sp>
-    </p:spTree>
-  </p:cSld>
-  <p:clrMapOvr>
-    <a:masterClrMapping/>
-  </p:clrMapOvr>
-</p:notes>
-</file>
-
-<file path=ppt/notesSlides/notesSlide19.xml><?xml version="1.0" encoding="utf-8"?>
-<p:notes xmlns:a="http://schemas.openxmlformats.org/drawingml/2006/main" xmlns:r="http://schemas.openxmlformats.org/officeDocument/2006/relationships" xmlns:p="http://schemas.openxmlformats.org/presentationml/2006/main">
-  <p:cSld>
-    <p:spTree>
-      <p:nvGrpSpPr>
-        <p:cNvPr id="1" name=""/>
-        <p:cNvGrpSpPr/>
-        <p:nvPr/>
-      </p:nvGrpSpPr>
-      <p:grpSpPr>
-        <a:xfrm>
-          <a:off x="0" y="0"/>
-          <a:ext cx="0" cy="0"/>
-          <a:chOff x="0" y="0"/>
-          <a:chExt cx="0" cy="0"/>
-        </a:xfrm>
-      </p:grpSpPr>
-      <p:sp>
-        <p:nvSpPr>
-          <p:cNvPr id="46082" name="Rectangle 2"/>
-          <p:cNvSpPr>
-            <a:spLocks noGrp="1" noRot="1" noChangeAspect="1" noChangeArrowheads="1" noTextEdit="1"/>
-          </p:cNvSpPr>
-          <p:nvPr>
-            <p:ph type="sldImg"/>
-          </p:nvPr>
-        </p:nvSpPr>
-        <p:spPr/>
-      </p:sp>
-      <p:sp>
-        <p:nvSpPr>
-          <p:cNvPr id="46083" name="Rectangle 3"/>
-          <p:cNvSpPr>
-            <a:spLocks noGrp="1" noChangeArrowheads="1"/>
-          </p:cNvSpPr>
-          <p:nvPr>
-            <p:ph type="body" idx="1"/>
-          </p:nvPr>
-        </p:nvSpPr>
-        <p:spPr bwMode="auto">
-          <a:xfrm>
-            <a:off x="686270" y="4344229"/>
-            <a:ext cx="5485463" cy="4114387"/>
-          </a:xfrm>
-          <a:prstGeom prst="rect">
-            <a:avLst/>
-          </a:prstGeom>
-          <a:noFill/>
-          <a:ln>
-            <a:miter lim="800000"/>
-            <a:headEnd/>
-            <a:tailEnd/>
-          </a:ln>
-        </p:spPr>
-        <p:txBody>
-          <a:bodyPr/>
-          <a:lstStyle/>
-          <a:p>
-            <a:endParaRPr lang="en-US"/>
           </a:p>
         </p:txBody>
       </p:sp>
@@ -1607,7 +1644,7 @@
       </p:grpSpPr>
       <p:sp>
         <p:nvSpPr>
-          <p:cNvPr id="48130" name="Rectangle 2"/>
+          <p:cNvPr id="46082" name="Rectangle 2"/>
           <p:cNvSpPr>
             <a:spLocks noGrp="1" noRot="1" noChangeAspect="1" noChangeArrowheads="1" noTextEdit="1"/>
           </p:cNvSpPr>
@@ -1619,7 +1656,7 @@
       </p:sp>
       <p:sp>
         <p:nvSpPr>
-          <p:cNvPr id="48131" name="Rectangle 3"/>
+          <p:cNvPr id="46083" name="Rectangle 3"/>
           <p:cNvSpPr>
             <a:spLocks noGrp="1" noChangeArrowheads="1"/>
           </p:cNvSpPr>
@@ -1747,6 +1784,76 @@
       </p:grpSpPr>
       <p:sp>
         <p:nvSpPr>
+          <p:cNvPr id="48130" name="Rectangle 2"/>
+          <p:cNvSpPr>
+            <a:spLocks noGrp="1" noRot="1" noChangeAspect="1" noChangeArrowheads="1" noTextEdit="1"/>
+          </p:cNvSpPr>
+          <p:nvPr>
+            <p:ph type="sldImg"/>
+          </p:nvPr>
+        </p:nvSpPr>
+        <p:spPr/>
+      </p:sp>
+      <p:sp>
+        <p:nvSpPr>
+          <p:cNvPr id="48131" name="Rectangle 3"/>
+          <p:cNvSpPr>
+            <a:spLocks noGrp="1" noChangeArrowheads="1"/>
+          </p:cNvSpPr>
+          <p:nvPr>
+            <p:ph type="body" idx="1"/>
+          </p:nvPr>
+        </p:nvSpPr>
+        <p:spPr bwMode="auto">
+          <a:xfrm>
+            <a:off x="686270" y="4344229"/>
+            <a:ext cx="5485463" cy="4114387"/>
+          </a:xfrm>
+          <a:prstGeom prst="rect">
+            <a:avLst/>
+          </a:prstGeom>
+          <a:noFill/>
+          <a:ln>
+            <a:miter lim="800000"/>
+            <a:headEnd/>
+            <a:tailEnd/>
+          </a:ln>
+        </p:spPr>
+        <p:txBody>
+          <a:bodyPr/>
+          <a:lstStyle/>
+          <a:p>
+            <a:endParaRPr lang="en-US"/>
+          </a:p>
+        </p:txBody>
+      </p:sp>
+    </p:spTree>
+  </p:cSld>
+  <p:clrMapOvr>
+    <a:masterClrMapping/>
+  </p:clrMapOvr>
+</p:notes>
+</file>
+
+<file path=ppt/notesSlides/notesSlide23.xml><?xml version="1.0" encoding="utf-8"?>
+<p:notes xmlns:a="http://schemas.openxmlformats.org/drawingml/2006/main" xmlns:r="http://schemas.openxmlformats.org/officeDocument/2006/relationships" xmlns:p="http://schemas.openxmlformats.org/presentationml/2006/main">
+  <p:cSld>
+    <p:spTree>
+      <p:nvGrpSpPr>
+        <p:cNvPr id="1" name=""/>
+        <p:cNvGrpSpPr/>
+        <p:nvPr/>
+      </p:nvGrpSpPr>
+      <p:grpSpPr>
+        <a:xfrm>
+          <a:off x="0" y="0"/>
+          <a:ext cx="0" cy="0"/>
+          <a:chOff x="0" y="0"/>
+          <a:chExt cx="0" cy="0"/>
+        </a:xfrm>
+      </p:grpSpPr>
+      <p:sp>
+        <p:nvSpPr>
           <p:cNvPr id="50178" name="Rectangle 2"/>
           <p:cNvSpPr>
             <a:spLocks noGrp="1" noRot="1" noChangeAspect="1" noChangeArrowheads="1" noTextEdit="1"/>
@@ -1798,7 +1905,7 @@
 </p:notes>
 </file>
 
-<file path=ppt/notesSlides/notesSlide23.xml><?xml version="1.0" encoding="utf-8"?>
+<file path=ppt/notesSlides/notesSlide24.xml><?xml version="1.0" encoding="utf-8"?>
 <p:notes xmlns:a="http://schemas.openxmlformats.org/drawingml/2006/main" xmlns:r="http://schemas.openxmlformats.org/officeDocument/2006/relationships" xmlns:p="http://schemas.openxmlformats.org/presentationml/2006/main">
   <p:cSld>
     <p:spTree>
@@ -1891,7 +1998,7 @@
           <a:p>
             <a:fld id="{40F5A9F4-14AB-4E34-9372-28158D5523BB}" type="slidenum">
               <a:rPr lang="en-US" smtClean="0"/>
-              <a:t>42</a:t>
+              <a:t>44</a:t>
             </a:fld>
             <a:endParaRPr lang="en-US"/>
           </a:p>
@@ -1910,7 +2017,7 @@
 </p:notes>
 </file>
 
-<file path=ppt/notesSlides/notesSlide24.xml><?xml version="1.0" encoding="utf-8"?>
+<file path=ppt/notesSlides/notesSlide25.xml><?xml version="1.0" encoding="utf-8"?>
 <p:notes xmlns:a="http://schemas.openxmlformats.org/drawingml/2006/main" xmlns:r="http://schemas.openxmlformats.org/officeDocument/2006/relationships" xmlns:p="http://schemas.openxmlformats.org/presentationml/2006/main">
   <p:cSld>
     <p:spTree>
@@ -1980,7 +2087,7 @@
 </p:notes>
 </file>
 
-<file path=ppt/notesSlides/notesSlide25.xml><?xml version="1.0" encoding="utf-8"?>
+<file path=ppt/notesSlides/notesSlide26.xml><?xml version="1.0" encoding="utf-8"?>
 <p:notes xmlns:a="http://schemas.openxmlformats.org/drawingml/2006/main" xmlns:r="http://schemas.openxmlformats.org/officeDocument/2006/relationships" xmlns:p="http://schemas.openxmlformats.org/presentationml/2006/main">
   <p:cSld>
     <p:spTree>
@@ -2050,7 +2157,7 @@
 </p:notes>
 </file>
 
-<file path=ppt/notesSlides/notesSlide26.xml><?xml version="1.0" encoding="utf-8"?>
+<file path=ppt/notesSlides/notesSlide27.xml><?xml version="1.0" encoding="utf-8"?>
 <p:notes xmlns:a="http://schemas.openxmlformats.org/drawingml/2006/main" xmlns:r="http://schemas.openxmlformats.org/officeDocument/2006/relationships" xmlns:p="http://schemas.openxmlformats.org/presentationml/2006/main">
   <p:cSld>
     <p:spTree>
@@ -2151,7 +2258,7 @@
           <a:p>
             <a:fld id="{40F5A9F4-14AB-4E34-9372-28158D5523BB}" type="slidenum">
               <a:rPr lang="en-US" smtClean="0"/>
-              <a:t>46</a:t>
+              <a:t>48</a:t>
             </a:fld>
             <a:endParaRPr lang="en-US"/>
           </a:p>
@@ -2170,7 +2277,7 @@
 </p:notes>
 </file>
 
-<file path=ppt/notesSlides/notesSlide27.xml><?xml version="1.0" encoding="utf-8"?>
+<file path=ppt/notesSlides/notesSlide28.xml><?xml version="1.0" encoding="utf-8"?>
 <p:notes xmlns:a="http://schemas.openxmlformats.org/drawingml/2006/main" xmlns:r="http://schemas.openxmlformats.org/officeDocument/2006/relationships" xmlns:p="http://schemas.openxmlformats.org/presentationml/2006/main">
   <p:cSld>
     <p:spTree>
@@ -2240,7 +2347,7 @@
 </p:notes>
 </file>
 
-<file path=ppt/notesSlides/notesSlide28.xml><?xml version="1.0" encoding="utf-8"?>
+<file path=ppt/notesSlides/notesSlide29.xml><?xml version="1.0" encoding="utf-8"?>
 <p:notes xmlns:a="http://schemas.openxmlformats.org/drawingml/2006/main" xmlns:r="http://schemas.openxmlformats.org/officeDocument/2006/relationships" xmlns:p="http://schemas.openxmlformats.org/presentationml/2006/main">
   <p:cSld>
     <p:spTree>
@@ -2272,76 +2379,6 @@
       <p:sp>
         <p:nvSpPr>
           <p:cNvPr id="54275" name="Rectangle 3"/>
-          <p:cNvSpPr>
-            <a:spLocks noGrp="1" noChangeArrowheads="1"/>
-          </p:cNvSpPr>
-          <p:nvPr>
-            <p:ph type="body" idx="1"/>
-          </p:nvPr>
-        </p:nvSpPr>
-        <p:spPr bwMode="auto">
-          <a:xfrm>
-            <a:off x="686270" y="4344229"/>
-            <a:ext cx="5485463" cy="4114387"/>
-          </a:xfrm>
-          <a:prstGeom prst="rect">
-            <a:avLst/>
-          </a:prstGeom>
-          <a:noFill/>
-          <a:ln>
-            <a:miter lim="800000"/>
-            <a:headEnd/>
-            <a:tailEnd/>
-          </a:ln>
-        </p:spPr>
-        <p:txBody>
-          <a:bodyPr/>
-          <a:lstStyle/>
-          <a:p>
-            <a:endParaRPr lang="en-US"/>
-          </a:p>
-        </p:txBody>
-      </p:sp>
-    </p:spTree>
-  </p:cSld>
-  <p:clrMapOvr>
-    <a:masterClrMapping/>
-  </p:clrMapOvr>
-</p:notes>
-</file>
-
-<file path=ppt/notesSlides/notesSlide29.xml><?xml version="1.0" encoding="utf-8"?>
-<p:notes xmlns:a="http://schemas.openxmlformats.org/drawingml/2006/main" xmlns:r="http://schemas.openxmlformats.org/officeDocument/2006/relationships" xmlns:p="http://schemas.openxmlformats.org/presentationml/2006/main">
-  <p:cSld>
-    <p:spTree>
-      <p:nvGrpSpPr>
-        <p:cNvPr id="1" name=""/>
-        <p:cNvGrpSpPr/>
-        <p:nvPr/>
-      </p:nvGrpSpPr>
-      <p:grpSpPr>
-        <a:xfrm>
-          <a:off x="0" y="0"/>
-          <a:ext cx="0" cy="0"/>
-          <a:chOff x="0" y="0"/>
-          <a:chExt cx="0" cy="0"/>
-        </a:xfrm>
-      </p:grpSpPr>
-      <p:sp>
-        <p:nvSpPr>
-          <p:cNvPr id="55298" name="Rectangle 2"/>
-          <p:cNvSpPr>
-            <a:spLocks noGrp="1" noRot="1" noChangeAspect="1" noChangeArrowheads="1" noTextEdit="1"/>
-          </p:cNvSpPr>
-          <p:nvPr>
-            <p:ph type="sldImg"/>
-          </p:nvPr>
-        </p:nvSpPr>
-        <p:spPr/>
-      </p:sp>
-      <p:sp>
-        <p:nvSpPr>
-          <p:cNvPr id="55299" name="Rectangle 3"/>
           <p:cNvSpPr>
             <a:spLocks noGrp="1" noChangeArrowheads="1"/>
           </p:cNvSpPr>
@@ -2469,7 +2506,7 @@
       </p:grpSpPr>
       <p:sp>
         <p:nvSpPr>
-          <p:cNvPr id="56322" name="Rectangle 2"/>
+          <p:cNvPr id="55298" name="Rectangle 2"/>
           <p:cNvSpPr>
             <a:spLocks noGrp="1" noRot="1" noChangeAspect="1" noChangeArrowheads="1" noTextEdit="1"/>
           </p:cNvSpPr>
@@ -2481,7 +2518,7 @@
       </p:sp>
       <p:sp>
         <p:nvSpPr>
-          <p:cNvPr id="56323" name="Rectangle 3"/>
+          <p:cNvPr id="55299" name="Rectangle 3"/>
           <p:cNvSpPr>
             <a:spLocks noGrp="1" noChangeArrowheads="1"/>
           </p:cNvSpPr>
@@ -2539,7 +2576,7 @@
       </p:grpSpPr>
       <p:sp>
         <p:nvSpPr>
-          <p:cNvPr id="57346" name="Rectangle 2"/>
+          <p:cNvPr id="56322" name="Rectangle 2"/>
           <p:cNvSpPr>
             <a:spLocks noGrp="1" noRot="1" noChangeAspect="1" noChangeArrowheads="1" noTextEdit="1"/>
           </p:cNvSpPr>
@@ -2551,7 +2588,7 @@
       </p:sp>
       <p:sp>
         <p:nvSpPr>
-          <p:cNvPr id="57347" name="Rectangle 3"/>
+          <p:cNvPr id="56323" name="Rectangle 3"/>
           <p:cNvSpPr>
             <a:spLocks noGrp="1" noChangeArrowheads="1"/>
           </p:cNvSpPr>
@@ -2660,6 +2697,76 @@
 </p:notes>
 </file>
 
+<file path=ppt/notesSlides/notesSlide33.xml><?xml version="1.0" encoding="utf-8"?>
+<p:notes xmlns:a="http://schemas.openxmlformats.org/drawingml/2006/main" xmlns:r="http://schemas.openxmlformats.org/officeDocument/2006/relationships" xmlns:p="http://schemas.openxmlformats.org/presentationml/2006/main">
+  <p:cSld>
+    <p:spTree>
+      <p:nvGrpSpPr>
+        <p:cNvPr id="1" name=""/>
+        <p:cNvGrpSpPr/>
+        <p:nvPr/>
+      </p:nvGrpSpPr>
+      <p:grpSpPr>
+        <a:xfrm>
+          <a:off x="0" y="0"/>
+          <a:ext cx="0" cy="0"/>
+          <a:chOff x="0" y="0"/>
+          <a:chExt cx="0" cy="0"/>
+        </a:xfrm>
+      </p:grpSpPr>
+      <p:sp>
+        <p:nvSpPr>
+          <p:cNvPr id="57346" name="Rectangle 2"/>
+          <p:cNvSpPr>
+            <a:spLocks noGrp="1" noRot="1" noChangeAspect="1" noChangeArrowheads="1" noTextEdit="1"/>
+          </p:cNvSpPr>
+          <p:nvPr>
+            <p:ph type="sldImg"/>
+          </p:nvPr>
+        </p:nvSpPr>
+        <p:spPr/>
+      </p:sp>
+      <p:sp>
+        <p:nvSpPr>
+          <p:cNvPr id="57347" name="Rectangle 3"/>
+          <p:cNvSpPr>
+            <a:spLocks noGrp="1" noChangeArrowheads="1"/>
+          </p:cNvSpPr>
+          <p:nvPr>
+            <p:ph type="body" idx="1"/>
+          </p:nvPr>
+        </p:nvSpPr>
+        <p:spPr bwMode="auto">
+          <a:xfrm>
+            <a:off x="686270" y="4344229"/>
+            <a:ext cx="5485463" cy="4114387"/>
+          </a:xfrm>
+          <a:prstGeom prst="rect">
+            <a:avLst/>
+          </a:prstGeom>
+          <a:noFill/>
+          <a:ln>
+            <a:miter lim="800000"/>
+            <a:headEnd/>
+            <a:tailEnd/>
+          </a:ln>
+        </p:spPr>
+        <p:txBody>
+          <a:bodyPr/>
+          <a:lstStyle/>
+          <a:p>
+            <a:endParaRPr lang="en-US"/>
+          </a:p>
+        </p:txBody>
+      </p:sp>
+    </p:spTree>
+  </p:cSld>
+  <p:clrMapOvr>
+    <a:masterClrMapping/>
+  </p:clrMapOvr>
+</p:notes>
+</file>
+
 <file path=ppt/notesSlides/notesSlide4.xml><?xml version="1.0" encoding="utf-8"?>
 <p:notes xmlns:a="http://schemas.openxmlformats.org/drawingml/2006/main" xmlns:r="http://schemas.openxmlformats.org/officeDocument/2006/relationships" xmlns:p="http://schemas.openxmlformats.org/presentationml/2006/main">
   <p:cSld>
@@ -3221,7 +3328,7 @@
           <a:p>
             <a:fld id="{FB7712AD-3B21-4FE9-B722-CF9B0200D9B9}" type="datetimeFigureOut">
               <a:rPr lang="en-US" smtClean="0"/>
-              <a:t>9/13/2017</a:t>
+              <a:t>9/14/2017</a:t>
             </a:fld>
             <a:endParaRPr lang="en-US"/>
           </a:p>
@@ -3401,7 +3508,7 @@
           <a:p>
             <a:fld id="{FB7712AD-3B21-4FE9-B722-CF9B0200D9B9}" type="datetimeFigureOut">
               <a:rPr lang="en-US" smtClean="0"/>
-              <a:t>9/13/2017</a:t>
+              <a:t>9/14/2017</a:t>
             </a:fld>
             <a:endParaRPr lang="en-US"/>
           </a:p>
@@ -3591,7 +3698,7 @@
           <a:p>
             <a:fld id="{FB7712AD-3B21-4FE9-B722-CF9B0200D9B9}" type="datetimeFigureOut">
               <a:rPr lang="en-US" smtClean="0"/>
-              <a:t>9/13/2017</a:t>
+              <a:t>9/14/2017</a:t>
             </a:fld>
             <a:endParaRPr lang="en-US"/>
           </a:p>
@@ -5624,7 +5731,7 @@
           <a:p>
             <a:fld id="{FB7712AD-3B21-4FE9-B722-CF9B0200D9B9}" type="datetimeFigureOut">
               <a:rPr lang="en-US" smtClean="0"/>
-              <a:t>9/13/2017</a:t>
+              <a:t>9/14/2017</a:t>
             </a:fld>
             <a:endParaRPr lang="en-US"/>
           </a:p>
@@ -6455,7 +6562,7 @@
           <a:p>
             <a:fld id="{FB7712AD-3B21-4FE9-B722-CF9B0200D9B9}" type="datetimeFigureOut">
               <a:rPr lang="en-US" smtClean="0"/>
-              <a:t>9/13/2017</a:t>
+              <a:t>9/14/2017</a:t>
             </a:fld>
             <a:endParaRPr lang="en-US"/>
           </a:p>
@@ -6752,7 +6859,7 @@
           <a:p>
             <a:fld id="{FB7712AD-3B21-4FE9-B722-CF9B0200D9B9}" type="datetimeFigureOut">
               <a:rPr lang="en-US" smtClean="0"/>
-              <a:t>9/13/2017</a:t>
+              <a:t>9/14/2017</a:t>
             </a:fld>
             <a:endParaRPr lang="en-US"/>
           </a:p>
@@ -7188,7 +7295,7 @@
           <a:p>
             <a:fld id="{FB7712AD-3B21-4FE9-B722-CF9B0200D9B9}" type="datetimeFigureOut">
               <a:rPr lang="en-US" smtClean="0"/>
-              <a:t>9/13/2017</a:t>
+              <a:t>9/14/2017</a:t>
             </a:fld>
             <a:endParaRPr lang="en-US"/>
           </a:p>
@@ -7317,7 +7424,7 @@
           <a:p>
             <a:fld id="{FB7712AD-3B21-4FE9-B722-CF9B0200D9B9}" type="datetimeFigureOut">
               <a:rPr lang="en-US" smtClean="0"/>
-              <a:t>9/13/2017</a:t>
+              <a:t>9/14/2017</a:t>
             </a:fld>
             <a:endParaRPr lang="en-US"/>
           </a:p>
@@ -7424,7 +7531,7 @@
           <a:p>
             <a:fld id="{FB7712AD-3B21-4FE9-B722-CF9B0200D9B9}" type="datetimeFigureOut">
               <a:rPr lang="en-US" smtClean="0"/>
-              <a:t>9/13/2017</a:t>
+              <a:t>9/14/2017</a:t>
             </a:fld>
             <a:endParaRPr lang="en-US"/>
           </a:p>
@@ -7711,7 +7818,7 @@
           <a:p>
             <a:fld id="{FB7712AD-3B21-4FE9-B722-CF9B0200D9B9}" type="datetimeFigureOut">
               <a:rPr lang="en-US" smtClean="0"/>
-              <a:t>9/13/2017</a:t>
+              <a:t>9/14/2017</a:t>
             </a:fld>
             <a:endParaRPr lang="en-US"/>
           </a:p>
@@ -7978,7 +8085,7 @@
           <a:p>
             <a:fld id="{FB7712AD-3B21-4FE9-B722-CF9B0200D9B9}" type="datetimeFigureOut">
               <a:rPr lang="en-US" smtClean="0"/>
-              <a:t>9/13/2017</a:t>
+              <a:t>9/14/2017</a:t>
             </a:fld>
             <a:endParaRPr lang="en-US"/>
           </a:p>
@@ -8304,7 +8411,7 @@
           <a:p>
             <a:fld id="{FB7712AD-3B21-4FE9-B722-CF9B0200D9B9}" type="datetimeFigureOut">
               <a:rPr lang="en-US" smtClean="0"/>
-              <a:t>9/13/2017</a:t>
+              <a:t>9/14/2017</a:t>
             </a:fld>
             <a:endParaRPr lang="en-US"/>
           </a:p>
@@ -12774,33 +12881,8 @@
                 <a:latin typeface="Courier New" pitchFamily="49" charset="0"/>
                 <a:cs typeface="Courier New" pitchFamily="49" charset="0"/>
               </a:rPr>
-              <a:t> </a:t>
-            </a:r>
-            <a:r>
-              <a:rPr lang="en-US" dirty="0" err="1">
-                <a:latin typeface="Courier New" pitchFamily="49" charset="0"/>
-                <a:cs typeface="Courier New" pitchFamily="49" charset="0"/>
-              </a:rPr>
-              <a:t>ol</a:t>
-            </a:r>
-            <a:r>
-              <a:rPr lang="en-US" dirty="0">
-                <a:latin typeface="Courier New" pitchFamily="49" charset="0"/>
-                <a:cs typeface="Courier New" pitchFamily="49" charset="0"/>
-              </a:rPr>
-              <a:t> </a:t>
-            </a:r>
-            <a:r>
-              <a:rPr lang="en-US" dirty="0" err="1">
-                <a:latin typeface="Courier New" pitchFamily="49" charset="0"/>
-                <a:cs typeface="Courier New" pitchFamily="49" charset="0"/>
-              </a:rPr>
-              <a:t>li</a:t>
-            </a:r>
-            <a:endParaRPr lang="en-US" dirty="0">
-              <a:latin typeface="Courier New" pitchFamily="49" charset="0"/>
-              <a:cs typeface="Courier New" pitchFamily="49" charset="0"/>
-            </a:endParaRPr>
+              <a:t> li</a:t>
+            </a:r>
           </a:p>
           <a:p>
             <a:endParaRPr lang="en-US" dirty="0"/>
@@ -13045,6 +13127,117 @@
 </file>
 
 <file path=ppt/slides/slide16.xml><?xml version="1.0" encoding="utf-8"?>
+<p:sld xmlns:a="http://schemas.openxmlformats.org/drawingml/2006/main" xmlns:r="http://schemas.openxmlformats.org/officeDocument/2006/relationships" xmlns:p="http://schemas.openxmlformats.org/presentationml/2006/main">
+  <p:cSld>
+    <p:spTree>
+      <p:nvGrpSpPr>
+        <p:cNvPr id="1" name=""/>
+        <p:cNvGrpSpPr/>
+        <p:nvPr/>
+      </p:nvGrpSpPr>
+      <p:grpSpPr>
+        <a:xfrm>
+          <a:off x="0" y="0"/>
+          <a:ext cx="0" cy="0"/>
+          <a:chOff x="0" y="0"/>
+          <a:chExt cx="0" cy="0"/>
+        </a:xfrm>
+      </p:grpSpPr>
+      <p:sp>
+        <p:nvSpPr>
+          <p:cNvPr id="2" name="Title 1"/>
+          <p:cNvSpPr>
+            <a:spLocks noGrp="1"/>
+          </p:cNvSpPr>
+          <p:nvPr>
+            <p:ph type="title"/>
+          </p:nvPr>
+        </p:nvSpPr>
+        <p:spPr/>
+        <p:txBody>
+          <a:bodyPr/>
+          <a:lstStyle/>
+          <a:p>
+            <a:r>
+              <a:rPr lang="en-US" dirty="0"/>
+              <a:t>Contextual Selector Example*</a:t>
+            </a:r>
+          </a:p>
+        </p:txBody>
+      </p:sp>
+      <p:sp>
+        <p:nvSpPr>
+          <p:cNvPr id="3" name="Content Placeholder 2"/>
+          <p:cNvSpPr>
+            <a:spLocks noGrp="1"/>
+          </p:cNvSpPr>
+          <p:nvPr>
+            <p:ph idx="1"/>
+          </p:nvPr>
+        </p:nvSpPr>
+        <p:spPr/>
+        <p:txBody>
+          <a:bodyPr>
+            <a:normAutofit/>
+          </a:bodyPr>
+          <a:lstStyle/>
+          <a:p>
+            <a:r>
+              <a:rPr lang="en-US" dirty="0"/>
+              <a:t>Authors may want selectors to match elements that appear in a certain context, such as “only those EM elements that are contained by an H1 element”</a:t>
+            </a:r>
+          </a:p>
+          <a:p>
+            <a:endParaRPr lang="en-US" dirty="0"/>
+          </a:p>
+          <a:p>
+            <a:r>
+              <a:rPr lang="en-US" dirty="0"/>
+              <a:t>H1 { color: red }</a:t>
+            </a:r>
+          </a:p>
+          <a:p>
+            <a:r>
+              <a:rPr lang="en-US" dirty="0"/>
+              <a:t>EM { color: red }</a:t>
+            </a:r>
+          </a:p>
+          <a:p>
+            <a:r>
+              <a:rPr lang="en-US" b="1" dirty="0">
+                <a:solidFill>
+                  <a:srgbClr val="0070C0"/>
+                </a:solidFill>
+              </a:rPr>
+              <a:t>H1 EM { color: blue }</a:t>
+            </a:r>
+            <a:endParaRPr lang="en-US" b="1" dirty="0">
+              <a:solidFill>
+                <a:srgbClr val="0070C0"/>
+              </a:solidFill>
+              <a:latin typeface="Courier New" pitchFamily="49" charset="0"/>
+              <a:cs typeface="Courier New" pitchFamily="49" charset="0"/>
+            </a:endParaRPr>
+          </a:p>
+          <a:p>
+            <a:endParaRPr lang="en-US" dirty="0"/>
+          </a:p>
+        </p:txBody>
+      </p:sp>
+    </p:spTree>
+    <p:extLst>
+      <p:ext uri="{BB962C8B-B14F-4D97-AF65-F5344CB8AC3E}">
+        <p14:creationId xmlns:p14="http://schemas.microsoft.com/office/powerpoint/2010/main" val="2687119307"/>
+      </p:ext>
+    </p:extLst>
+  </p:cSld>
+  <p:clrMapOvr>
+    <a:masterClrMapping/>
+  </p:clrMapOvr>
+</p:sld>
+</file>
+
+<file path=ppt/slides/slide17.xml><?xml version="1.0" encoding="utf-8"?>
 <p:sld xmlns:a="http://schemas.openxmlformats.org/drawingml/2006/main" xmlns:r="http://schemas.openxmlformats.org/officeDocument/2006/relationships" xmlns:p="http://schemas.openxmlformats.org/presentationml/2006/main">
   <p:cSld>
     <p:spTree>
@@ -13731,7 +13924,7 @@
 </p:sld>
 </file>
 
-<file path=ppt/slides/slide17.xml><?xml version="1.0" encoding="utf-8"?>
+<file path=ppt/slides/slide18.xml><?xml version="1.0" encoding="utf-8"?>
 <p:sld xmlns:a="http://schemas.openxmlformats.org/drawingml/2006/main" xmlns:r="http://schemas.openxmlformats.org/officeDocument/2006/relationships" xmlns:p="http://schemas.openxmlformats.org/presentationml/2006/main">
   <p:cSld>
     <p:spTree>
@@ -14428,7 +14621,7 @@
 </p:sld>
 </file>
 
-<file path=ppt/slides/slide18.xml><?xml version="1.0" encoding="utf-8"?>
+<file path=ppt/slides/slide19.xml><?xml version="1.0" encoding="utf-8"?>
 <p:sld xmlns:a="http://schemas.openxmlformats.org/drawingml/2006/main" xmlns:r="http://schemas.openxmlformats.org/officeDocument/2006/relationships" xmlns:p="http://schemas.openxmlformats.org/presentationml/2006/main">
   <p:cSld>
     <p:spTree>
@@ -14868,377 +15061,6 @@
     </p:tnLst>
     <p:bldLst>
       <p:bldP spid="4" grpId="0" uiExpand="1" build="p"/>
-    </p:bldLst>
-  </p:timing>
-</p:sld>
-</file>
-
-<file path=ppt/slides/slide19.xml><?xml version="1.0" encoding="utf-8"?>
-<p:sld xmlns:a="http://schemas.openxmlformats.org/drawingml/2006/main" xmlns:r="http://schemas.openxmlformats.org/officeDocument/2006/relationships" xmlns:p="http://schemas.openxmlformats.org/presentationml/2006/main">
-  <p:cSld>
-    <p:spTree>
-      <p:nvGrpSpPr>
-        <p:cNvPr id="1" name=""/>
-        <p:cNvGrpSpPr/>
-        <p:nvPr/>
-      </p:nvGrpSpPr>
-      <p:grpSpPr>
-        <a:xfrm>
-          <a:off x="0" y="0"/>
-          <a:ext cx="0" cy="0"/>
-          <a:chOff x="0" y="0"/>
-          <a:chExt cx="0" cy="0"/>
-        </a:xfrm>
-      </p:grpSpPr>
-      <p:sp>
-        <p:nvSpPr>
-          <p:cNvPr id="2" name="Title 1"/>
-          <p:cNvSpPr>
-            <a:spLocks noGrp="1"/>
-          </p:cNvSpPr>
-          <p:nvPr>
-            <p:ph type="title"/>
-          </p:nvPr>
-        </p:nvSpPr>
-        <p:spPr/>
-        <p:txBody>
-          <a:bodyPr>
-            <a:normAutofit/>
-          </a:bodyPr>
-          <a:lstStyle/>
-          <a:p>
-            <a:r>
-              <a:rPr lang="en-US" dirty="0"/>
-              <a:t>Universal Selectors</a:t>
-            </a:r>
-          </a:p>
-        </p:txBody>
-      </p:sp>
-      <p:sp>
-        <p:nvSpPr>
-          <p:cNvPr id="3" name="Content Placeholder 2"/>
-          <p:cNvSpPr>
-            <a:spLocks noGrp="1"/>
-          </p:cNvSpPr>
-          <p:nvPr>
-            <p:ph idx="1"/>
-          </p:nvPr>
-        </p:nvSpPr>
-        <p:spPr/>
-        <p:txBody>
-          <a:bodyPr/>
-          <a:lstStyle/>
-          <a:p>
-            <a:pPr>
-              <a:lnSpc>
-                <a:spcPct val="100000"/>
-              </a:lnSpc>
-            </a:pPr>
-            <a:r>
-              <a:rPr lang="en-US" b="1" i="1" dirty="0">
-                <a:solidFill>
-                  <a:srgbClr val="FF0000"/>
-                </a:solidFill>
-              </a:rPr>
-              <a:t>Universal selectors </a:t>
-            </a:r>
-            <a:r>
-              <a:rPr lang="en-US" dirty="0"/>
-              <a:t>are denoted by the asterisk</a:t>
-            </a:r>
-          </a:p>
-          <a:p>
-            <a:r>
-              <a:rPr lang="en-US" dirty="0"/>
-              <a:t>They apply styling to all elements in the document</a:t>
-            </a:r>
-          </a:p>
-          <a:p>
-            <a:endParaRPr lang="en-US" dirty="0"/>
-          </a:p>
-          <a:p>
-            <a:r>
-              <a:rPr lang="en-US" dirty="0"/>
-              <a:t>Example:</a:t>
-            </a:r>
-          </a:p>
-          <a:p>
-            <a:pPr>
-              <a:lnSpc>
-                <a:spcPct val="100000"/>
-              </a:lnSpc>
-              <a:buNone/>
-            </a:pPr>
-            <a:r>
-              <a:rPr lang="en-US" dirty="0"/>
-              <a:t>     </a:t>
-            </a:r>
-            <a:r>
-              <a:rPr lang="en-US" sz="2800" dirty="0">
-                <a:latin typeface="Courier New" pitchFamily="49" charset="0"/>
-              </a:rPr>
-              <a:t>* {color: red;}</a:t>
-            </a:r>
-          </a:p>
-          <a:p>
-            <a:pPr>
-              <a:lnSpc>
-                <a:spcPct val="100000"/>
-              </a:lnSpc>
-              <a:buNone/>
-            </a:pPr>
-            <a:endParaRPr lang="en-US" sz="2800" dirty="0">
-              <a:latin typeface="Courier New" pitchFamily="49" charset="0"/>
-            </a:endParaRPr>
-          </a:p>
-          <a:p>
-            <a:r>
-              <a:rPr lang="en-US" dirty="0"/>
-              <a:t>Not often useful</a:t>
-            </a:r>
-          </a:p>
-          <a:p>
-            <a:endParaRPr lang="en-US" dirty="0"/>
-          </a:p>
-        </p:txBody>
-      </p:sp>
-    </p:spTree>
-    <p:extLst>
-      <p:ext uri="{BB962C8B-B14F-4D97-AF65-F5344CB8AC3E}">
-        <p14:creationId xmlns:p14="http://schemas.microsoft.com/office/powerpoint/2010/main" val="3111576365"/>
-      </p:ext>
-    </p:extLst>
-  </p:cSld>
-  <p:clrMapOvr>
-    <a:masterClrMapping/>
-  </p:clrMapOvr>
-  <p:timing>
-    <p:tnLst>
-      <p:par>
-        <p:cTn id="1" dur="indefinite" restart="never" nodeType="tmRoot">
-          <p:childTnLst>
-            <p:seq concurrent="1" nextAc="seek">
-              <p:cTn id="2" dur="indefinite" nodeType="mainSeq">
-                <p:childTnLst>
-                  <p:par>
-                    <p:cTn id="3" fill="hold">
-                      <p:stCondLst>
-                        <p:cond delay="indefinite"/>
-                      </p:stCondLst>
-                      <p:childTnLst>
-                        <p:par>
-                          <p:cTn id="4" fill="hold">
-                            <p:stCondLst>
-                              <p:cond delay="0"/>
-                            </p:stCondLst>
-                            <p:childTnLst>
-                              <p:par>
-                                <p:cTn id="5" presetID="1" presetClass="entr" presetSubtype="0" fill="hold" grpId="0" nodeType="clickEffect">
-                                  <p:stCondLst>
-                                    <p:cond delay="0"/>
-                                  </p:stCondLst>
-                                  <p:childTnLst>
-                                    <p:set>
-                                      <p:cBhvr>
-                                        <p:cTn id="6" dur="1" fill="hold">
-                                          <p:stCondLst>
-                                            <p:cond delay="0"/>
-                                          </p:stCondLst>
-                                        </p:cTn>
-                                        <p:tgtEl>
-                                          <p:spTgt spid="3">
-                                            <p:txEl>
-                                              <p:pRg st="1" end="1"/>
-                                            </p:txEl>
-                                          </p:spTgt>
-                                        </p:tgtEl>
-                                        <p:attrNameLst>
-                                          <p:attrName>style.visibility</p:attrName>
-                                        </p:attrNameLst>
-                                      </p:cBhvr>
-                                      <p:to>
-                                        <p:strVal val="visible"/>
-                                      </p:to>
-                                    </p:set>
-                                  </p:childTnLst>
-                                </p:cTn>
-                              </p:par>
-                            </p:childTnLst>
-                          </p:cTn>
-                        </p:par>
-                      </p:childTnLst>
-                    </p:cTn>
-                  </p:par>
-                  <p:par>
-                    <p:cTn id="7" fill="hold">
-                      <p:stCondLst>
-                        <p:cond delay="indefinite"/>
-                      </p:stCondLst>
-                      <p:childTnLst>
-                        <p:par>
-                          <p:cTn id="8" fill="hold">
-                            <p:stCondLst>
-                              <p:cond delay="0"/>
-                            </p:stCondLst>
-                            <p:childTnLst>
-                              <p:par>
-                                <p:cTn id="9" presetID="1" presetClass="entr" presetSubtype="0" fill="hold" grpId="0" nodeType="clickEffect">
-                                  <p:stCondLst>
-                                    <p:cond delay="0"/>
-                                  </p:stCondLst>
-                                  <p:childTnLst>
-                                    <p:set>
-                                      <p:cBhvr>
-                                        <p:cTn id="10" dur="1" fill="hold">
-                                          <p:stCondLst>
-                                            <p:cond delay="0"/>
-                                          </p:stCondLst>
-                                        </p:cTn>
-                                        <p:tgtEl>
-                                          <p:spTgt spid="3">
-                                            <p:txEl>
-                                              <p:pRg st="3" end="3"/>
-                                            </p:txEl>
-                                          </p:spTgt>
-                                        </p:tgtEl>
-                                        <p:attrNameLst>
-                                          <p:attrName>style.visibility</p:attrName>
-                                        </p:attrNameLst>
-                                      </p:cBhvr>
-                                      <p:to>
-                                        <p:strVal val="visible"/>
-                                      </p:to>
-                                    </p:set>
-                                  </p:childTnLst>
-                                </p:cTn>
-                              </p:par>
-                            </p:childTnLst>
-                          </p:cTn>
-                        </p:par>
-                      </p:childTnLst>
-                    </p:cTn>
-                  </p:par>
-                  <p:par>
-                    <p:cTn id="11" fill="hold">
-                      <p:stCondLst>
-                        <p:cond delay="indefinite"/>
-                      </p:stCondLst>
-                      <p:childTnLst>
-                        <p:par>
-                          <p:cTn id="12" fill="hold">
-                            <p:stCondLst>
-                              <p:cond delay="0"/>
-                            </p:stCondLst>
-                            <p:childTnLst>
-                              <p:par>
-                                <p:cTn id="13" presetID="1" presetClass="entr" presetSubtype="0" fill="hold" grpId="0" nodeType="clickEffect">
-                                  <p:stCondLst>
-                                    <p:cond delay="0"/>
-                                  </p:stCondLst>
-                                  <p:childTnLst>
-                                    <p:set>
-                                      <p:cBhvr>
-                                        <p:cTn id="14" dur="1" fill="hold">
-                                          <p:stCondLst>
-                                            <p:cond delay="0"/>
-                                          </p:stCondLst>
-                                        </p:cTn>
-                                        <p:tgtEl>
-                                          <p:spTgt spid="3">
-                                            <p:txEl>
-                                              <p:pRg st="4" end="4"/>
-                                            </p:txEl>
-                                          </p:spTgt>
-                                        </p:tgtEl>
-                                        <p:attrNameLst>
-                                          <p:attrName>style.visibility</p:attrName>
-                                        </p:attrNameLst>
-                                      </p:cBhvr>
-                                      <p:to>
-                                        <p:strVal val="visible"/>
-                                      </p:to>
-                                    </p:set>
-                                  </p:childTnLst>
-                                </p:cTn>
-                              </p:par>
-                            </p:childTnLst>
-                          </p:cTn>
-                        </p:par>
-                      </p:childTnLst>
-                    </p:cTn>
-                  </p:par>
-                  <p:par>
-                    <p:cTn id="15" fill="hold">
-                      <p:stCondLst>
-                        <p:cond delay="indefinite"/>
-                      </p:stCondLst>
-                      <p:childTnLst>
-                        <p:par>
-                          <p:cTn id="16" fill="hold">
-                            <p:stCondLst>
-                              <p:cond delay="0"/>
-                            </p:stCondLst>
-                            <p:childTnLst>
-                              <p:par>
-                                <p:cTn id="17" presetID="1" presetClass="entr" presetSubtype="0" fill="hold" grpId="0" nodeType="clickEffect">
-                                  <p:stCondLst>
-                                    <p:cond delay="0"/>
-                                  </p:stCondLst>
-                                  <p:childTnLst>
-                                    <p:set>
-                                      <p:cBhvr>
-                                        <p:cTn id="18" dur="1" fill="hold">
-                                          <p:stCondLst>
-                                            <p:cond delay="0"/>
-                                          </p:stCondLst>
-                                        </p:cTn>
-                                        <p:tgtEl>
-                                          <p:spTgt spid="3">
-                                            <p:txEl>
-                                              <p:pRg st="6" end="6"/>
-                                            </p:txEl>
-                                          </p:spTgt>
-                                        </p:tgtEl>
-                                        <p:attrNameLst>
-                                          <p:attrName>style.visibility</p:attrName>
-                                        </p:attrNameLst>
-                                      </p:cBhvr>
-                                      <p:to>
-                                        <p:strVal val="visible"/>
-                                      </p:to>
-                                    </p:set>
-                                  </p:childTnLst>
-                                </p:cTn>
-                              </p:par>
-                            </p:childTnLst>
-                          </p:cTn>
-                        </p:par>
-                      </p:childTnLst>
-                    </p:cTn>
-                  </p:par>
-                </p:childTnLst>
-              </p:cTn>
-              <p:prevCondLst>
-                <p:cond evt="onPrev" delay="0">
-                  <p:tgtEl>
-                    <p:sldTgt/>
-                  </p:tgtEl>
-                </p:cond>
-              </p:prevCondLst>
-              <p:nextCondLst>
-                <p:cond evt="onNext" delay="0">
-                  <p:tgtEl>
-                    <p:sldTgt/>
-                  </p:tgtEl>
-                </p:cond>
-              </p:nextCondLst>
-            </p:seq>
-          </p:childTnLst>
-        </p:cTn>
-      </p:par>
-    </p:tnLst>
-    <p:bldLst>
-      <p:bldP spid="3" grpId="0" uiExpand="1" build="p"/>
     </p:bldLst>
   </p:timing>
 </p:sld>
@@ -15718,6 +15540,377 @@
       </p:grpSpPr>
       <p:sp>
         <p:nvSpPr>
+          <p:cNvPr id="2" name="Title 1"/>
+          <p:cNvSpPr>
+            <a:spLocks noGrp="1"/>
+          </p:cNvSpPr>
+          <p:nvPr>
+            <p:ph type="title"/>
+          </p:nvPr>
+        </p:nvSpPr>
+        <p:spPr/>
+        <p:txBody>
+          <a:bodyPr>
+            <a:normAutofit/>
+          </a:bodyPr>
+          <a:lstStyle/>
+          <a:p>
+            <a:r>
+              <a:rPr lang="en-US" dirty="0"/>
+              <a:t>Universal Selectors</a:t>
+            </a:r>
+          </a:p>
+        </p:txBody>
+      </p:sp>
+      <p:sp>
+        <p:nvSpPr>
+          <p:cNvPr id="3" name="Content Placeholder 2"/>
+          <p:cNvSpPr>
+            <a:spLocks noGrp="1"/>
+          </p:cNvSpPr>
+          <p:nvPr>
+            <p:ph idx="1"/>
+          </p:nvPr>
+        </p:nvSpPr>
+        <p:spPr/>
+        <p:txBody>
+          <a:bodyPr/>
+          <a:lstStyle/>
+          <a:p>
+            <a:pPr>
+              <a:lnSpc>
+                <a:spcPct val="100000"/>
+              </a:lnSpc>
+            </a:pPr>
+            <a:r>
+              <a:rPr lang="en-US" b="1" i="1" dirty="0">
+                <a:solidFill>
+                  <a:srgbClr val="FF0000"/>
+                </a:solidFill>
+              </a:rPr>
+              <a:t>Universal selectors </a:t>
+            </a:r>
+            <a:r>
+              <a:rPr lang="en-US" dirty="0"/>
+              <a:t>are denoted by the asterisk</a:t>
+            </a:r>
+          </a:p>
+          <a:p>
+            <a:r>
+              <a:rPr lang="en-US" dirty="0"/>
+              <a:t>They apply styling to all elements in the document</a:t>
+            </a:r>
+          </a:p>
+          <a:p>
+            <a:endParaRPr lang="en-US" dirty="0"/>
+          </a:p>
+          <a:p>
+            <a:r>
+              <a:rPr lang="en-US" dirty="0"/>
+              <a:t>Example:</a:t>
+            </a:r>
+          </a:p>
+          <a:p>
+            <a:pPr>
+              <a:lnSpc>
+                <a:spcPct val="100000"/>
+              </a:lnSpc>
+              <a:buNone/>
+            </a:pPr>
+            <a:r>
+              <a:rPr lang="en-US" dirty="0"/>
+              <a:t>     </a:t>
+            </a:r>
+            <a:r>
+              <a:rPr lang="en-US" sz="2800" dirty="0">
+                <a:latin typeface="Courier New" pitchFamily="49" charset="0"/>
+              </a:rPr>
+              <a:t>* {color: red;}</a:t>
+            </a:r>
+          </a:p>
+          <a:p>
+            <a:pPr>
+              <a:lnSpc>
+                <a:spcPct val="100000"/>
+              </a:lnSpc>
+              <a:buNone/>
+            </a:pPr>
+            <a:endParaRPr lang="en-US" sz="2800" dirty="0">
+              <a:latin typeface="Courier New" pitchFamily="49" charset="0"/>
+            </a:endParaRPr>
+          </a:p>
+          <a:p>
+            <a:r>
+              <a:rPr lang="en-US" dirty="0"/>
+              <a:t>Not often useful</a:t>
+            </a:r>
+          </a:p>
+          <a:p>
+            <a:endParaRPr lang="en-US" dirty="0"/>
+          </a:p>
+        </p:txBody>
+      </p:sp>
+    </p:spTree>
+    <p:extLst>
+      <p:ext uri="{BB962C8B-B14F-4D97-AF65-F5344CB8AC3E}">
+        <p14:creationId xmlns:p14="http://schemas.microsoft.com/office/powerpoint/2010/main" val="3111576365"/>
+      </p:ext>
+    </p:extLst>
+  </p:cSld>
+  <p:clrMapOvr>
+    <a:masterClrMapping/>
+  </p:clrMapOvr>
+  <p:timing>
+    <p:tnLst>
+      <p:par>
+        <p:cTn id="1" dur="indefinite" restart="never" nodeType="tmRoot">
+          <p:childTnLst>
+            <p:seq concurrent="1" nextAc="seek">
+              <p:cTn id="2" dur="indefinite" nodeType="mainSeq">
+                <p:childTnLst>
+                  <p:par>
+                    <p:cTn id="3" fill="hold">
+                      <p:stCondLst>
+                        <p:cond delay="indefinite"/>
+                      </p:stCondLst>
+                      <p:childTnLst>
+                        <p:par>
+                          <p:cTn id="4" fill="hold">
+                            <p:stCondLst>
+                              <p:cond delay="0"/>
+                            </p:stCondLst>
+                            <p:childTnLst>
+                              <p:par>
+                                <p:cTn id="5" presetID="1" presetClass="entr" presetSubtype="0" fill="hold" grpId="0" nodeType="clickEffect">
+                                  <p:stCondLst>
+                                    <p:cond delay="0"/>
+                                  </p:stCondLst>
+                                  <p:childTnLst>
+                                    <p:set>
+                                      <p:cBhvr>
+                                        <p:cTn id="6" dur="1" fill="hold">
+                                          <p:stCondLst>
+                                            <p:cond delay="0"/>
+                                          </p:stCondLst>
+                                        </p:cTn>
+                                        <p:tgtEl>
+                                          <p:spTgt spid="3">
+                                            <p:txEl>
+                                              <p:pRg st="1" end="1"/>
+                                            </p:txEl>
+                                          </p:spTgt>
+                                        </p:tgtEl>
+                                        <p:attrNameLst>
+                                          <p:attrName>style.visibility</p:attrName>
+                                        </p:attrNameLst>
+                                      </p:cBhvr>
+                                      <p:to>
+                                        <p:strVal val="visible"/>
+                                      </p:to>
+                                    </p:set>
+                                  </p:childTnLst>
+                                </p:cTn>
+                              </p:par>
+                            </p:childTnLst>
+                          </p:cTn>
+                        </p:par>
+                      </p:childTnLst>
+                    </p:cTn>
+                  </p:par>
+                  <p:par>
+                    <p:cTn id="7" fill="hold">
+                      <p:stCondLst>
+                        <p:cond delay="indefinite"/>
+                      </p:stCondLst>
+                      <p:childTnLst>
+                        <p:par>
+                          <p:cTn id="8" fill="hold">
+                            <p:stCondLst>
+                              <p:cond delay="0"/>
+                            </p:stCondLst>
+                            <p:childTnLst>
+                              <p:par>
+                                <p:cTn id="9" presetID="1" presetClass="entr" presetSubtype="0" fill="hold" grpId="0" nodeType="clickEffect">
+                                  <p:stCondLst>
+                                    <p:cond delay="0"/>
+                                  </p:stCondLst>
+                                  <p:childTnLst>
+                                    <p:set>
+                                      <p:cBhvr>
+                                        <p:cTn id="10" dur="1" fill="hold">
+                                          <p:stCondLst>
+                                            <p:cond delay="0"/>
+                                          </p:stCondLst>
+                                        </p:cTn>
+                                        <p:tgtEl>
+                                          <p:spTgt spid="3">
+                                            <p:txEl>
+                                              <p:pRg st="3" end="3"/>
+                                            </p:txEl>
+                                          </p:spTgt>
+                                        </p:tgtEl>
+                                        <p:attrNameLst>
+                                          <p:attrName>style.visibility</p:attrName>
+                                        </p:attrNameLst>
+                                      </p:cBhvr>
+                                      <p:to>
+                                        <p:strVal val="visible"/>
+                                      </p:to>
+                                    </p:set>
+                                  </p:childTnLst>
+                                </p:cTn>
+                              </p:par>
+                            </p:childTnLst>
+                          </p:cTn>
+                        </p:par>
+                      </p:childTnLst>
+                    </p:cTn>
+                  </p:par>
+                  <p:par>
+                    <p:cTn id="11" fill="hold">
+                      <p:stCondLst>
+                        <p:cond delay="indefinite"/>
+                      </p:stCondLst>
+                      <p:childTnLst>
+                        <p:par>
+                          <p:cTn id="12" fill="hold">
+                            <p:stCondLst>
+                              <p:cond delay="0"/>
+                            </p:stCondLst>
+                            <p:childTnLst>
+                              <p:par>
+                                <p:cTn id="13" presetID="1" presetClass="entr" presetSubtype="0" fill="hold" grpId="0" nodeType="clickEffect">
+                                  <p:stCondLst>
+                                    <p:cond delay="0"/>
+                                  </p:stCondLst>
+                                  <p:childTnLst>
+                                    <p:set>
+                                      <p:cBhvr>
+                                        <p:cTn id="14" dur="1" fill="hold">
+                                          <p:stCondLst>
+                                            <p:cond delay="0"/>
+                                          </p:stCondLst>
+                                        </p:cTn>
+                                        <p:tgtEl>
+                                          <p:spTgt spid="3">
+                                            <p:txEl>
+                                              <p:pRg st="4" end="4"/>
+                                            </p:txEl>
+                                          </p:spTgt>
+                                        </p:tgtEl>
+                                        <p:attrNameLst>
+                                          <p:attrName>style.visibility</p:attrName>
+                                        </p:attrNameLst>
+                                      </p:cBhvr>
+                                      <p:to>
+                                        <p:strVal val="visible"/>
+                                      </p:to>
+                                    </p:set>
+                                  </p:childTnLst>
+                                </p:cTn>
+                              </p:par>
+                            </p:childTnLst>
+                          </p:cTn>
+                        </p:par>
+                      </p:childTnLst>
+                    </p:cTn>
+                  </p:par>
+                  <p:par>
+                    <p:cTn id="15" fill="hold">
+                      <p:stCondLst>
+                        <p:cond delay="indefinite"/>
+                      </p:stCondLst>
+                      <p:childTnLst>
+                        <p:par>
+                          <p:cTn id="16" fill="hold">
+                            <p:stCondLst>
+                              <p:cond delay="0"/>
+                            </p:stCondLst>
+                            <p:childTnLst>
+                              <p:par>
+                                <p:cTn id="17" presetID="1" presetClass="entr" presetSubtype="0" fill="hold" grpId="0" nodeType="clickEffect">
+                                  <p:stCondLst>
+                                    <p:cond delay="0"/>
+                                  </p:stCondLst>
+                                  <p:childTnLst>
+                                    <p:set>
+                                      <p:cBhvr>
+                                        <p:cTn id="18" dur="1" fill="hold">
+                                          <p:stCondLst>
+                                            <p:cond delay="0"/>
+                                          </p:stCondLst>
+                                        </p:cTn>
+                                        <p:tgtEl>
+                                          <p:spTgt spid="3">
+                                            <p:txEl>
+                                              <p:pRg st="6" end="6"/>
+                                            </p:txEl>
+                                          </p:spTgt>
+                                        </p:tgtEl>
+                                        <p:attrNameLst>
+                                          <p:attrName>style.visibility</p:attrName>
+                                        </p:attrNameLst>
+                                      </p:cBhvr>
+                                      <p:to>
+                                        <p:strVal val="visible"/>
+                                      </p:to>
+                                    </p:set>
+                                  </p:childTnLst>
+                                </p:cTn>
+                              </p:par>
+                            </p:childTnLst>
+                          </p:cTn>
+                        </p:par>
+                      </p:childTnLst>
+                    </p:cTn>
+                  </p:par>
+                </p:childTnLst>
+              </p:cTn>
+              <p:prevCondLst>
+                <p:cond evt="onPrev" delay="0">
+                  <p:tgtEl>
+                    <p:sldTgt/>
+                  </p:tgtEl>
+                </p:cond>
+              </p:prevCondLst>
+              <p:nextCondLst>
+                <p:cond evt="onNext" delay="0">
+                  <p:tgtEl>
+                    <p:sldTgt/>
+                  </p:tgtEl>
+                </p:cond>
+              </p:nextCondLst>
+            </p:seq>
+          </p:childTnLst>
+        </p:cTn>
+      </p:par>
+    </p:tnLst>
+    <p:bldLst>
+      <p:bldP spid="3" grpId="0" uiExpand="1" build="p"/>
+    </p:bldLst>
+  </p:timing>
+</p:sld>
+</file>
+
+<file path=ppt/slides/slide21.xml><?xml version="1.0" encoding="utf-8"?>
+<p:sld xmlns:a="http://schemas.openxmlformats.org/drawingml/2006/main" xmlns:r="http://schemas.openxmlformats.org/officeDocument/2006/relationships" xmlns:p="http://schemas.openxmlformats.org/presentationml/2006/main">
+  <p:cSld>
+    <p:spTree>
+      <p:nvGrpSpPr>
+        <p:cNvPr id="1" name=""/>
+        <p:cNvGrpSpPr/>
+        <p:nvPr/>
+      </p:nvGrpSpPr>
+      <p:grpSpPr>
+        <a:xfrm>
+          <a:off x="0" y="0"/>
+          <a:ext cx="0" cy="0"/>
+          <a:chOff x="0" y="0"/>
+          <a:chExt cx="0" cy="0"/>
+        </a:xfrm>
+      </p:grpSpPr>
+      <p:sp>
+        <p:nvSpPr>
           <p:cNvPr id="3" name="Title 2"/>
           <p:cNvSpPr>
             <a:spLocks noGrp="1"/>
@@ -15969,7 +16162,7 @@
 </p:sld>
 </file>
 
-<file path=ppt/slides/slide21.xml><?xml version="1.0" encoding="utf-8"?>
+<file path=ppt/slides/slide22.xml><?xml version="1.0" encoding="utf-8"?>
 <p:sld xmlns:a="http://schemas.openxmlformats.org/drawingml/2006/main" xmlns:r="http://schemas.openxmlformats.org/officeDocument/2006/relationships" xmlns:p="http://schemas.openxmlformats.org/presentationml/2006/main">
   <p:cSld>
     <p:spTree>
@@ -16059,7 +16252,7 @@
 </p:sld>
 </file>
 
-<file path=ppt/slides/slide22.xml><?xml version="1.0" encoding="utf-8"?>
+<file path=ppt/slides/slide23.xml><?xml version="1.0" encoding="utf-8"?>
 <p:sld xmlns:a="http://schemas.openxmlformats.org/drawingml/2006/main" xmlns:r="http://schemas.openxmlformats.org/officeDocument/2006/relationships" xmlns:p="http://schemas.openxmlformats.org/presentationml/2006/main">
   <p:cSld>
     <p:spTree>
@@ -16111,7 +16304,7 @@
 </p:sld>
 </file>
 
-<file path=ppt/slides/slide23.xml><?xml version="1.0" encoding="utf-8"?>
+<file path=ppt/slides/slide24.xml><?xml version="1.0" encoding="utf-8"?>
 <p:sld xmlns:a="http://schemas.openxmlformats.org/drawingml/2006/main" xmlns:r="http://schemas.openxmlformats.org/officeDocument/2006/relationships" xmlns:p="http://schemas.openxmlformats.org/presentationml/2006/main">
   <p:cSld>
     <p:spTree>
@@ -16662,7 +16855,7 @@
 </p:sld>
 </file>
 
-<file path=ppt/slides/slide24.xml><?xml version="1.0" encoding="utf-8"?>
+<file path=ppt/slides/slide25.xml><?xml version="1.0" encoding="utf-8"?>
 <p:sld xmlns:a="http://schemas.openxmlformats.org/drawingml/2006/main" xmlns:r="http://schemas.openxmlformats.org/officeDocument/2006/relationships" xmlns:p="http://schemas.openxmlformats.org/presentationml/2006/main">
   <p:cSld>
     <p:spTree>
@@ -16689,7 +16882,12 @@
             <p:ph type="title"/>
           </p:nvPr>
         </p:nvSpPr>
-        <p:spPr/>
+        <p:spPr>
+          <a:xfrm>
+            <a:off x="660400" y="317500"/>
+            <a:ext cx="7848600" cy="584200"/>
+          </a:xfrm>
+        </p:spPr>
         <p:txBody>
           <a:bodyPr>
             <a:normAutofit fontScale="90000"/>
@@ -17333,7 +17531,7 @@
 </p:sld>
 </file>
 
-<file path=ppt/slides/slide25.xml><?xml version="1.0" encoding="utf-8"?>
+<file path=ppt/slides/slide26.xml><?xml version="1.0" encoding="utf-8"?>
 <p:sld xmlns:a="http://schemas.openxmlformats.org/drawingml/2006/main" xmlns:r="http://schemas.openxmlformats.org/officeDocument/2006/relationships" xmlns:p="http://schemas.openxmlformats.org/presentationml/2006/main">
   <p:cSld>
     <p:spTree>
@@ -18001,7 +18199,7 @@
 </p:sld>
 </file>
 
-<file path=ppt/slides/slide26.xml><?xml version="1.0" encoding="utf-8"?>
+<file path=ppt/slides/slide27.xml><?xml version="1.0" encoding="utf-8"?>
 <p:sld xmlns:a="http://schemas.openxmlformats.org/drawingml/2006/main" xmlns:r="http://schemas.openxmlformats.org/officeDocument/2006/relationships" xmlns:p="http://schemas.openxmlformats.org/presentationml/2006/main">
   <p:cSld>
     <p:spTree>
@@ -18386,7 +18584,7 @@
 </p:sld>
 </file>
 
-<file path=ppt/slides/slide27.xml><?xml version="1.0" encoding="utf-8"?>
+<file path=ppt/slides/slide28.xml><?xml version="1.0" encoding="utf-8"?>
 <p:sld xmlns:a="http://schemas.openxmlformats.org/drawingml/2006/main" xmlns:r="http://schemas.openxmlformats.org/officeDocument/2006/relationships" xmlns:p="http://schemas.openxmlformats.org/presentationml/2006/main">
   <p:cSld>
     <p:spTree>
@@ -18438,7 +18636,7 @@
 </p:sld>
 </file>
 
-<file path=ppt/slides/slide28.xml><?xml version="1.0" encoding="utf-8"?>
+<file path=ppt/slides/slide29.xml><?xml version="1.0" encoding="utf-8"?>
 <p:sld xmlns:a="http://schemas.openxmlformats.org/drawingml/2006/main" xmlns:r="http://schemas.openxmlformats.org/officeDocument/2006/relationships" xmlns:p="http://schemas.openxmlformats.org/presentationml/2006/main">
   <p:cSld>
     <p:spTree>
@@ -19188,7 +19386,59 @@
 </p:sld>
 </file>
 
-<file path=ppt/slides/slide29.xml><?xml version="1.0" encoding="utf-8"?>
+<file path=ppt/slides/slide3.xml><?xml version="1.0" encoding="utf-8"?>
+<p:sld xmlns:a="http://schemas.openxmlformats.org/drawingml/2006/main" xmlns:r="http://schemas.openxmlformats.org/officeDocument/2006/relationships" xmlns:p="http://schemas.openxmlformats.org/presentationml/2006/main">
+  <p:cSld>
+    <p:spTree>
+      <p:nvGrpSpPr>
+        <p:cNvPr id="1" name=""/>
+        <p:cNvGrpSpPr/>
+        <p:nvPr/>
+      </p:nvGrpSpPr>
+      <p:grpSpPr>
+        <a:xfrm>
+          <a:off x="0" y="0"/>
+          <a:ext cx="0" cy="0"/>
+          <a:chOff x="0" y="0"/>
+          <a:chExt cx="0" cy="0"/>
+        </a:xfrm>
+      </p:grpSpPr>
+      <p:sp>
+        <p:nvSpPr>
+          <p:cNvPr id="4" name="Title 3"/>
+          <p:cNvSpPr>
+            <a:spLocks noGrp="1"/>
+          </p:cNvSpPr>
+          <p:nvPr>
+            <p:ph type="ctrTitle"/>
+          </p:nvPr>
+        </p:nvSpPr>
+        <p:spPr/>
+        <p:txBody>
+          <a:bodyPr/>
+          <a:lstStyle/>
+          <a:p>
+            <a:r>
+              <a:rPr lang="en-US" b="1" dirty="0"/>
+              <a:t>CSS Basics</a:t>
+            </a:r>
+          </a:p>
+        </p:txBody>
+      </p:sp>
+    </p:spTree>
+    <p:extLst>
+      <p:ext uri="{BB962C8B-B14F-4D97-AF65-F5344CB8AC3E}">
+        <p14:creationId xmlns:p14="http://schemas.microsoft.com/office/powerpoint/2010/main" val="1086344989"/>
+      </p:ext>
+    </p:extLst>
+  </p:cSld>
+  <p:clrMapOvr>
+    <a:masterClrMapping/>
+  </p:clrMapOvr>
+</p:sld>
+</file>
+
+<file path=ppt/slides/slide30.xml><?xml version="1.0" encoding="utf-8"?>
 <p:sld xmlns:a="http://schemas.openxmlformats.org/drawingml/2006/main" xmlns:r="http://schemas.openxmlformats.org/officeDocument/2006/relationships" xmlns:p="http://schemas.openxmlformats.org/presentationml/2006/main">
   <p:cSld>
     <p:spTree>
@@ -20042,59 +20292,7 @@
 </p:sld>
 </file>
 
-<file path=ppt/slides/slide3.xml><?xml version="1.0" encoding="utf-8"?>
-<p:sld xmlns:a="http://schemas.openxmlformats.org/drawingml/2006/main" xmlns:r="http://schemas.openxmlformats.org/officeDocument/2006/relationships" xmlns:p="http://schemas.openxmlformats.org/presentationml/2006/main">
-  <p:cSld>
-    <p:spTree>
-      <p:nvGrpSpPr>
-        <p:cNvPr id="1" name=""/>
-        <p:cNvGrpSpPr/>
-        <p:nvPr/>
-      </p:nvGrpSpPr>
-      <p:grpSpPr>
-        <a:xfrm>
-          <a:off x="0" y="0"/>
-          <a:ext cx="0" cy="0"/>
-          <a:chOff x="0" y="0"/>
-          <a:chExt cx="0" cy="0"/>
-        </a:xfrm>
-      </p:grpSpPr>
-      <p:sp>
-        <p:nvSpPr>
-          <p:cNvPr id="4" name="Title 3"/>
-          <p:cNvSpPr>
-            <a:spLocks noGrp="1"/>
-          </p:cNvSpPr>
-          <p:nvPr>
-            <p:ph type="ctrTitle"/>
-          </p:nvPr>
-        </p:nvSpPr>
-        <p:spPr/>
-        <p:txBody>
-          <a:bodyPr/>
-          <a:lstStyle/>
-          <a:p>
-            <a:r>
-              <a:rPr lang="en-US" b="1" dirty="0"/>
-              <a:t>CSS Basics</a:t>
-            </a:r>
-          </a:p>
-        </p:txBody>
-      </p:sp>
-    </p:spTree>
-    <p:extLst>
-      <p:ext uri="{BB962C8B-B14F-4D97-AF65-F5344CB8AC3E}">
-        <p14:creationId xmlns:p14="http://schemas.microsoft.com/office/powerpoint/2010/main" val="1086344989"/>
-      </p:ext>
-    </p:extLst>
-  </p:cSld>
-  <p:clrMapOvr>
-    <a:masterClrMapping/>
-  </p:clrMapOvr>
-</p:sld>
-</file>
-
-<file path=ppt/slides/slide30.xml><?xml version="1.0" encoding="utf-8"?>
+<file path=ppt/slides/slide31.xml><?xml version="1.0" encoding="utf-8"?>
 <p:sld xmlns:a="http://schemas.openxmlformats.org/drawingml/2006/main" xmlns:r="http://schemas.openxmlformats.org/officeDocument/2006/relationships" xmlns:p="http://schemas.openxmlformats.org/presentationml/2006/main">
   <p:cSld>
     <p:spTree>
@@ -20229,6 +20427,25 @@
               </a:rPr>
               <a:t>4px</a:t>
             </a:r>
+          </a:p>
+          <a:p>
+            <a:pPr lvl="1">
+              <a:buFont typeface="Arial" panose="020B0604020202020204" pitchFamily="34" charset="0"/>
+              <a:buChar char="•"/>
+            </a:pPr>
+            <a:endParaRPr lang="en-US" dirty="0">
+              <a:latin typeface="Courier New" pitchFamily="49" charset="0"/>
+              <a:cs typeface="Courier New" pitchFamily="49" charset="0"/>
+            </a:endParaRPr>
+          </a:p>
+          <a:p>
+            <a:pPr marL="457200" lvl="1" indent="0">
+              <a:buNone/>
+            </a:pPr>
+            <a:endParaRPr lang="en-US" dirty="0">
+              <a:latin typeface="Courier New" pitchFamily="49" charset="0"/>
+              <a:cs typeface="Courier New" pitchFamily="49" charset="0"/>
+            </a:endParaRPr>
           </a:p>
           <a:p>
             <a:endParaRPr lang="en-US" dirty="0"/>
@@ -20477,7 +20694,126 @@
 </p:sld>
 </file>
 
-<file path=ppt/slides/slide31.xml><?xml version="1.0" encoding="utf-8"?>
+<file path=ppt/slides/slide32.xml><?xml version="1.0" encoding="utf-8"?>
+<p:sld xmlns:a="http://schemas.openxmlformats.org/drawingml/2006/main" xmlns:r="http://schemas.openxmlformats.org/officeDocument/2006/relationships" xmlns:p="http://schemas.openxmlformats.org/presentationml/2006/main">
+  <p:cSld>
+    <p:spTree>
+      <p:nvGrpSpPr>
+        <p:cNvPr id="1" name=""/>
+        <p:cNvGrpSpPr/>
+        <p:nvPr/>
+      </p:nvGrpSpPr>
+      <p:grpSpPr>
+        <a:xfrm>
+          <a:off x="0" y="0"/>
+          <a:ext cx="0" cy="0"/>
+          <a:chOff x="0" y="0"/>
+          <a:chExt cx="0" cy="0"/>
+        </a:xfrm>
+      </p:grpSpPr>
+      <p:sp>
+        <p:nvSpPr>
+          <p:cNvPr id="2" name="Title 1"/>
+          <p:cNvSpPr>
+            <a:spLocks noGrp="1"/>
+          </p:cNvSpPr>
+          <p:nvPr>
+            <p:ph type="title"/>
+          </p:nvPr>
+        </p:nvSpPr>
+        <p:spPr/>
+        <p:txBody>
+          <a:bodyPr/>
+          <a:lstStyle/>
+          <a:p>
+            <a:r>
+              <a:rPr lang="en-US" dirty="0"/>
+              <a:t>HTML/CSS Properties and Property Value Example</a:t>
+            </a:r>
+          </a:p>
+        </p:txBody>
+      </p:sp>
+      <p:sp>
+        <p:nvSpPr>
+          <p:cNvPr id="5" name="Content Placeholder 4">
+            <a:extLst>
+              <a:ext uri="{FF2B5EF4-FFF2-40B4-BE49-F238E27FC236}">
+                <a16:creationId xmlns:a16="http://schemas.microsoft.com/office/drawing/2014/main" id="{BE7379B4-70E4-4E64-9798-A08DAAC226A7}"/>
+              </a:ext>
+            </a:extLst>
+          </p:cNvPr>
+          <p:cNvSpPr>
+            <a:spLocks noGrp="1"/>
+          </p:cNvSpPr>
+          <p:nvPr>
+            <p:ph idx="1"/>
+          </p:nvPr>
+        </p:nvSpPr>
+        <p:spPr/>
+        <p:txBody>
+          <a:bodyPr/>
+          <a:lstStyle/>
+          <a:p>
+            <a:r>
+              <a:rPr lang="en-US" dirty="0"/>
+              <a:t>Properties </a:t>
+            </a:r>
+            <a:r>
+              <a:rPr lang="en-US" dirty="0">
+                <a:hlinkClick r:id="rId3"/>
+              </a:rPr>
+              <a:t>[link]</a:t>
+            </a:r>
+            <a:endParaRPr lang="en-US" dirty="0"/>
+          </a:p>
+          <a:p>
+            <a:endParaRPr lang="en-US" dirty="0"/>
+          </a:p>
+          <a:p>
+            <a:r>
+              <a:rPr lang="en-US" dirty="0"/>
+              <a:t>Font Properties </a:t>
+            </a:r>
+            <a:r>
+              <a:rPr lang="en-US" dirty="0">
+                <a:hlinkClick r:id="rId4"/>
+              </a:rPr>
+              <a:t>[link]</a:t>
+            </a:r>
+            <a:endParaRPr lang="en-US" dirty="0"/>
+          </a:p>
+          <a:p>
+            <a:endParaRPr lang="en-US" dirty="0"/>
+          </a:p>
+          <a:p>
+            <a:r>
+              <a:rPr lang="en-US" dirty="0"/>
+              <a:t>Demo of Font Properties with Class CSS Selector* </a:t>
+            </a:r>
+            <a:r>
+              <a:rPr lang="en-US" dirty="0">
+                <a:hlinkClick r:id="rId4"/>
+              </a:rPr>
+              <a:t>[link]</a:t>
+            </a:r>
+            <a:endParaRPr lang="en-US" dirty="0"/>
+          </a:p>
+        </p:txBody>
+      </p:sp>
+    </p:spTree>
+    <p:extLst>
+      <p:ext uri="{BB962C8B-B14F-4D97-AF65-F5344CB8AC3E}">
+        <p14:creationId xmlns:p14="http://schemas.microsoft.com/office/powerpoint/2010/main" val="1074182116"/>
+      </p:ext>
+    </p:extLst>
+  </p:cSld>
+  <p:clrMapOvr>
+    <a:masterClrMapping/>
+  </p:clrMapOvr>
+</p:sld>
+</file>
+
+<file path=ppt/slides/slide33.xml><?xml version="1.0" encoding="utf-8"?>
 <p:sld xmlns:a="http://schemas.openxmlformats.org/drawingml/2006/main" xmlns:r="http://schemas.openxmlformats.org/officeDocument/2006/relationships" xmlns:p="http://schemas.openxmlformats.org/presentationml/2006/main">
   <p:cSld>
     <p:spTree>
@@ -20677,7 +21013,7 @@
 </p:sld>
 </file>
 
-<file path=ppt/slides/slide32.xml><?xml version="1.0" encoding="utf-8"?>
+<file path=ppt/slides/slide34.xml><?xml version="1.0" encoding="utf-8"?>
 <p:sld xmlns:a="http://schemas.openxmlformats.org/drawingml/2006/main" xmlns:r="http://schemas.openxmlformats.org/officeDocument/2006/relationships" xmlns:p="http://schemas.openxmlformats.org/presentationml/2006/main">
   <p:cSld>
     <p:spTree>
@@ -20729,7 +21065,7 @@
 </p:sld>
 </file>
 
-<file path=ppt/slides/slide33.xml><?xml version="1.0" encoding="utf-8"?>
+<file path=ppt/slides/slide35.xml><?xml version="1.0" encoding="utf-8"?>
 <p:sld xmlns:a="http://schemas.openxmlformats.org/drawingml/2006/main" xmlns:r="http://schemas.openxmlformats.org/officeDocument/2006/relationships" xmlns:p="http://schemas.openxmlformats.org/presentationml/2006/main">
   <p:cSld>
     <p:spTree>
@@ -21464,7 +21800,7 @@
 </p:sld>
 </file>
 
-<file path=ppt/slides/slide34.xml><?xml version="1.0" encoding="utf-8"?>
+<file path=ppt/slides/slide36.xml><?xml version="1.0" encoding="utf-8"?>
 <p:sld xmlns:a="http://schemas.openxmlformats.org/drawingml/2006/main" xmlns:r="http://schemas.openxmlformats.org/officeDocument/2006/relationships" xmlns:p="http://schemas.openxmlformats.org/presentationml/2006/main">
   <p:cSld>
     <p:spTree>
@@ -21923,7 +22259,7 @@
 </p:sld>
 </file>
 
-<file path=ppt/slides/slide35.xml><?xml version="1.0" encoding="utf-8"?>
+<file path=ppt/slides/slide37.xml><?xml version="1.0" encoding="utf-8"?>
 <p:sld xmlns:a="http://schemas.openxmlformats.org/drawingml/2006/main" xmlns:r="http://schemas.openxmlformats.org/officeDocument/2006/relationships" xmlns:p="http://schemas.openxmlformats.org/presentationml/2006/main">
   <p:cSld>
     <p:spTree>
@@ -22027,7 +22363,7 @@
 </p:sld>
 </file>
 
-<file path=ppt/slides/slide36.xml><?xml version="1.0" encoding="utf-8"?>
+<file path=ppt/slides/slide38.xml><?xml version="1.0" encoding="utf-8"?>
 <p:sld xmlns:a="http://schemas.openxmlformats.org/drawingml/2006/main" xmlns:r="http://schemas.openxmlformats.org/officeDocument/2006/relationships" xmlns:p="http://schemas.openxmlformats.org/presentationml/2006/main">
   <p:cSld>
     <p:spTree>
@@ -22515,7 +22851,7 @@
 </p:sld>
 </file>
 
-<file path=ppt/slides/slide37.xml><?xml version="1.0" encoding="utf-8"?>
+<file path=ppt/slides/slide39.xml><?xml version="1.0" encoding="utf-8"?>
 <p:sld xmlns:a="http://schemas.openxmlformats.org/drawingml/2006/main" xmlns:r="http://schemas.openxmlformats.org/officeDocument/2006/relationships" xmlns:p="http://schemas.openxmlformats.org/presentationml/2006/main">
   <p:cSld>
     <p:spTree>
@@ -23403,558 +23739,6 @@
 </p:sld>
 </file>
 
-<file path=ppt/slides/slide38.xml><?xml version="1.0" encoding="utf-8"?>
-<p:sld xmlns:a="http://schemas.openxmlformats.org/drawingml/2006/main" xmlns:r="http://schemas.openxmlformats.org/officeDocument/2006/relationships" xmlns:p="http://schemas.openxmlformats.org/presentationml/2006/main">
-  <p:cSld>
-    <p:spTree>
-      <p:nvGrpSpPr>
-        <p:cNvPr id="1" name=""/>
-        <p:cNvGrpSpPr/>
-        <p:nvPr/>
-      </p:nvGrpSpPr>
-      <p:grpSpPr>
-        <a:xfrm>
-          <a:off x="0" y="0"/>
-          <a:ext cx="0" cy="0"/>
-          <a:chOff x="0" y="0"/>
-          <a:chExt cx="0" cy="0"/>
-        </a:xfrm>
-      </p:grpSpPr>
-      <p:sp>
-        <p:nvSpPr>
-          <p:cNvPr id="4" name="Title 3"/>
-          <p:cNvSpPr>
-            <a:spLocks noGrp="1"/>
-          </p:cNvSpPr>
-          <p:nvPr>
-            <p:ph type="ctrTitle"/>
-          </p:nvPr>
-        </p:nvSpPr>
-        <p:spPr/>
-        <p:txBody>
-          <a:bodyPr/>
-          <a:lstStyle/>
-          <a:p>
-            <a:r>
-              <a:rPr lang="en-US" b="1" dirty="0"/>
-              <a:t>Alignment and Borders</a:t>
-            </a:r>
-          </a:p>
-        </p:txBody>
-      </p:sp>
-    </p:spTree>
-    <p:extLst>
-      <p:ext uri="{BB962C8B-B14F-4D97-AF65-F5344CB8AC3E}">
-        <p14:creationId xmlns:p14="http://schemas.microsoft.com/office/powerpoint/2010/main" val="2727587897"/>
-      </p:ext>
-    </p:extLst>
-  </p:cSld>
-  <p:clrMapOvr>
-    <a:masterClrMapping/>
-  </p:clrMapOvr>
-</p:sld>
-</file>
-
-<file path=ppt/slides/slide39.xml><?xml version="1.0" encoding="utf-8"?>
-<p:sld xmlns:a="http://schemas.openxmlformats.org/drawingml/2006/main" xmlns:r="http://schemas.openxmlformats.org/officeDocument/2006/relationships" xmlns:p="http://schemas.openxmlformats.org/presentationml/2006/main">
-  <p:cSld>
-    <p:spTree>
-      <p:nvGrpSpPr>
-        <p:cNvPr id="1" name=""/>
-        <p:cNvGrpSpPr/>
-        <p:nvPr/>
-      </p:nvGrpSpPr>
-      <p:grpSpPr>
-        <a:xfrm>
-          <a:off x="0" y="0"/>
-          <a:ext cx="0" cy="0"/>
-          <a:chOff x="0" y="0"/>
-          <a:chExt cx="0" cy="0"/>
-        </a:xfrm>
-      </p:grpSpPr>
-      <p:sp>
-        <p:nvSpPr>
-          <p:cNvPr id="21506" name="Text Box 3"/>
-          <p:cNvSpPr txBox="1">
-            <a:spLocks noChangeArrowheads="1"/>
-          </p:cNvSpPr>
-          <p:nvPr/>
-        </p:nvSpPr>
-        <p:spPr bwMode="auto">
-          <a:xfrm>
-            <a:off x="1422400" y="857250"/>
-            <a:ext cx="184731" cy="341632"/>
-          </a:xfrm>
-          <a:prstGeom prst="rect">
-            <a:avLst/>
-          </a:prstGeom>
-          <a:noFill/>
-          <a:ln w="12700">
-            <a:noFill/>
-            <a:miter lim="800000"/>
-            <a:headEnd/>
-            <a:tailEnd/>
-          </a:ln>
-        </p:spPr>
-        <p:txBody>
-          <a:bodyPr wrap="none">
-            <a:spAutoFit/>
-          </a:bodyPr>
-          <a:lstStyle/>
-          <a:p>
-            <a:endParaRPr lang="en-US"/>
-          </a:p>
-        </p:txBody>
-      </p:sp>
-      <p:sp>
-        <p:nvSpPr>
-          <p:cNvPr id="5" name="Title 4"/>
-          <p:cNvSpPr>
-            <a:spLocks noGrp="1"/>
-          </p:cNvSpPr>
-          <p:nvPr>
-            <p:ph type="title"/>
-          </p:nvPr>
-        </p:nvSpPr>
-        <p:spPr/>
-        <p:txBody>
-          <a:bodyPr/>
-          <a:lstStyle/>
-          <a:p>
-            <a:r>
-              <a:rPr lang="en-US" dirty="0"/>
-              <a:t>Alignment of Text</a:t>
-            </a:r>
-          </a:p>
-        </p:txBody>
-      </p:sp>
-      <p:sp>
-        <p:nvSpPr>
-          <p:cNvPr id="6" name="Content Placeholder 5"/>
-          <p:cNvSpPr>
-            <a:spLocks noGrp="1"/>
-          </p:cNvSpPr>
-          <p:nvPr>
-            <p:ph idx="1"/>
-          </p:nvPr>
-        </p:nvSpPr>
-        <p:spPr>
-          <a:xfrm>
-            <a:off x="685800" y="1219200"/>
-            <a:ext cx="7772400" cy="4953000"/>
-          </a:xfrm>
-        </p:spPr>
-        <p:txBody>
-          <a:bodyPr>
-            <a:normAutofit/>
-          </a:bodyPr>
-          <a:lstStyle/>
-          <a:p>
-            <a:r>
-              <a:rPr lang="en-US" dirty="0"/>
-              <a:t>There are several ways of aligning text and other elements:</a:t>
-            </a:r>
-          </a:p>
-          <a:p>
-            <a:endParaRPr lang="en-US" dirty="0"/>
-          </a:p>
-          <a:p>
-            <a:r>
-              <a:rPr lang="en-US" dirty="0"/>
-              <a:t>The </a:t>
-            </a:r>
-            <a:r>
-              <a:rPr lang="en-US" sz="2800" dirty="0">
-                <a:latin typeface="Courier New" pitchFamily="49" charset="0"/>
-              </a:rPr>
-              <a:t>text-indent</a:t>
-            </a:r>
-            <a:r>
-              <a:rPr lang="en-US" dirty="0"/>
-              <a:t> property allows indentation </a:t>
-            </a:r>
-          </a:p>
-          <a:p>
-            <a:pPr lvl="1"/>
-            <a:r>
-              <a:rPr lang="en-US" dirty="0"/>
-              <a:t>Takes either a length or a % value</a:t>
-            </a:r>
-          </a:p>
-          <a:p>
-            <a:endParaRPr lang="en-US" dirty="0"/>
-          </a:p>
-          <a:p>
-            <a:r>
-              <a:rPr lang="en-US" dirty="0"/>
-              <a:t>The </a:t>
-            </a:r>
-            <a:r>
-              <a:rPr lang="en-US" sz="2800" dirty="0">
-                <a:latin typeface="Courier New" pitchFamily="49" charset="0"/>
-              </a:rPr>
-              <a:t>text-align</a:t>
-            </a:r>
-            <a:r>
-              <a:rPr lang="en-US" dirty="0"/>
-              <a:t> property has the possible values:</a:t>
-            </a:r>
-          </a:p>
-          <a:p>
-            <a:pPr lvl="1">
-              <a:buFont typeface="Arial" panose="020B0604020202020204" pitchFamily="34" charset="0"/>
-              <a:buChar char="•"/>
-            </a:pPr>
-            <a:r>
-              <a:rPr lang="en-US" sz="2400" dirty="0">
-                <a:latin typeface="Courier New" pitchFamily="49" charset="0"/>
-              </a:rPr>
-              <a:t>left</a:t>
-            </a:r>
-            <a:r>
-              <a:rPr lang="en-US" dirty="0"/>
-              <a:t> (the default)</a:t>
-            </a:r>
-          </a:p>
-          <a:p>
-            <a:pPr lvl="1">
-              <a:buFont typeface="Arial" panose="020B0604020202020204" pitchFamily="34" charset="0"/>
-              <a:buChar char="•"/>
-            </a:pPr>
-            <a:r>
-              <a:rPr lang="en-US" sz="2400" dirty="0">
-                <a:latin typeface="Courier New" pitchFamily="49" charset="0"/>
-              </a:rPr>
-              <a:t>center</a:t>
-            </a:r>
-            <a:endParaRPr lang="en-US" dirty="0"/>
-          </a:p>
-          <a:p>
-            <a:pPr lvl="1">
-              <a:buFont typeface="Arial" panose="020B0604020202020204" pitchFamily="34" charset="0"/>
-              <a:buChar char="•"/>
-            </a:pPr>
-            <a:r>
-              <a:rPr lang="en-US" sz="2400" dirty="0">
-                <a:latin typeface="Courier New" pitchFamily="49" charset="0"/>
-              </a:rPr>
-              <a:t>right</a:t>
-            </a:r>
-            <a:endParaRPr lang="en-US" dirty="0"/>
-          </a:p>
-          <a:p>
-            <a:pPr lvl="1">
-              <a:buFont typeface="Arial" panose="020B0604020202020204" pitchFamily="34" charset="0"/>
-              <a:buChar char="•"/>
-            </a:pPr>
-            <a:r>
-              <a:rPr lang="en-US" sz="2400" dirty="0">
-                <a:latin typeface="Courier New" pitchFamily="49" charset="0"/>
-              </a:rPr>
-              <a:t>justify</a:t>
-            </a:r>
-          </a:p>
-        </p:txBody>
-      </p:sp>
-    </p:spTree>
-    <p:extLst>
-      <p:ext uri="{BB962C8B-B14F-4D97-AF65-F5344CB8AC3E}">
-        <p14:creationId xmlns:p14="http://schemas.microsoft.com/office/powerpoint/2010/main" val="1243426832"/>
-      </p:ext>
-    </p:extLst>
-  </p:cSld>
-  <p:clrMapOvr>
-    <a:masterClrMapping/>
-  </p:clrMapOvr>
-  <p:timing>
-    <p:tnLst>
-      <p:par>
-        <p:cTn id="1" dur="indefinite" restart="never" nodeType="tmRoot">
-          <p:childTnLst>
-            <p:seq concurrent="1" nextAc="seek">
-              <p:cTn id="2" dur="indefinite" nodeType="mainSeq">
-                <p:childTnLst>
-                  <p:par>
-                    <p:cTn id="3" fill="hold">
-                      <p:stCondLst>
-                        <p:cond delay="indefinite"/>
-                      </p:stCondLst>
-                      <p:childTnLst>
-                        <p:par>
-                          <p:cTn id="4" fill="hold">
-                            <p:stCondLst>
-                              <p:cond delay="0"/>
-                            </p:stCondLst>
-                            <p:childTnLst>
-                              <p:par>
-                                <p:cTn id="5" presetID="1" presetClass="entr" presetSubtype="0" fill="hold" grpId="0" nodeType="clickEffect">
-                                  <p:stCondLst>
-                                    <p:cond delay="0"/>
-                                  </p:stCondLst>
-                                  <p:childTnLst>
-                                    <p:set>
-                                      <p:cBhvr>
-                                        <p:cTn id="6" dur="1" fill="hold">
-                                          <p:stCondLst>
-                                            <p:cond delay="0"/>
-                                          </p:stCondLst>
-                                        </p:cTn>
-                                        <p:tgtEl>
-                                          <p:spTgt spid="6">
-                                            <p:txEl>
-                                              <p:pRg st="2" end="2"/>
-                                            </p:txEl>
-                                          </p:spTgt>
-                                        </p:tgtEl>
-                                        <p:attrNameLst>
-                                          <p:attrName>style.visibility</p:attrName>
-                                        </p:attrNameLst>
-                                      </p:cBhvr>
-                                      <p:to>
-                                        <p:strVal val="visible"/>
-                                      </p:to>
-                                    </p:set>
-                                  </p:childTnLst>
-                                </p:cTn>
-                              </p:par>
-                              <p:par>
-                                <p:cTn id="7" presetID="1" presetClass="entr" presetSubtype="0" fill="hold" grpId="0" nodeType="withEffect">
-                                  <p:stCondLst>
-                                    <p:cond delay="0"/>
-                                  </p:stCondLst>
-                                  <p:childTnLst>
-                                    <p:set>
-                                      <p:cBhvr>
-                                        <p:cTn id="8" dur="1" fill="hold">
-                                          <p:stCondLst>
-                                            <p:cond delay="0"/>
-                                          </p:stCondLst>
-                                        </p:cTn>
-                                        <p:tgtEl>
-                                          <p:spTgt spid="6">
-                                            <p:txEl>
-                                              <p:pRg st="3" end="3"/>
-                                            </p:txEl>
-                                          </p:spTgt>
-                                        </p:tgtEl>
-                                        <p:attrNameLst>
-                                          <p:attrName>style.visibility</p:attrName>
-                                        </p:attrNameLst>
-                                      </p:cBhvr>
-                                      <p:to>
-                                        <p:strVal val="visible"/>
-                                      </p:to>
-                                    </p:set>
-                                  </p:childTnLst>
-                                </p:cTn>
-                              </p:par>
-                            </p:childTnLst>
-                          </p:cTn>
-                        </p:par>
-                      </p:childTnLst>
-                    </p:cTn>
-                  </p:par>
-                  <p:par>
-                    <p:cTn id="9" fill="hold">
-                      <p:stCondLst>
-                        <p:cond delay="indefinite"/>
-                      </p:stCondLst>
-                      <p:childTnLst>
-                        <p:par>
-                          <p:cTn id="10" fill="hold">
-                            <p:stCondLst>
-                              <p:cond delay="0"/>
-                            </p:stCondLst>
-                            <p:childTnLst>
-                              <p:par>
-                                <p:cTn id="11" presetID="1" presetClass="entr" presetSubtype="0" fill="hold" grpId="0" nodeType="clickEffect">
-                                  <p:stCondLst>
-                                    <p:cond delay="0"/>
-                                  </p:stCondLst>
-                                  <p:childTnLst>
-                                    <p:set>
-                                      <p:cBhvr>
-                                        <p:cTn id="12" dur="1" fill="hold">
-                                          <p:stCondLst>
-                                            <p:cond delay="0"/>
-                                          </p:stCondLst>
-                                        </p:cTn>
-                                        <p:tgtEl>
-                                          <p:spTgt spid="6">
-                                            <p:txEl>
-                                              <p:pRg st="5" end="5"/>
-                                            </p:txEl>
-                                          </p:spTgt>
-                                        </p:tgtEl>
-                                        <p:attrNameLst>
-                                          <p:attrName>style.visibility</p:attrName>
-                                        </p:attrNameLst>
-                                      </p:cBhvr>
-                                      <p:to>
-                                        <p:strVal val="visible"/>
-                                      </p:to>
-                                    </p:set>
-                                  </p:childTnLst>
-                                </p:cTn>
-                              </p:par>
-                              <p:par>
-                                <p:cTn id="13" presetID="1" presetClass="entr" presetSubtype="0" fill="hold" grpId="0" nodeType="withEffect">
-                                  <p:stCondLst>
-                                    <p:cond delay="0"/>
-                                  </p:stCondLst>
-                                  <p:childTnLst>
-                                    <p:set>
-                                      <p:cBhvr>
-                                        <p:cTn id="14" dur="1" fill="hold">
-                                          <p:stCondLst>
-                                            <p:cond delay="0"/>
-                                          </p:stCondLst>
-                                        </p:cTn>
-                                        <p:tgtEl>
-                                          <p:spTgt spid="6">
-                                            <p:txEl>
-                                              <p:pRg st="6" end="6"/>
-                                            </p:txEl>
-                                          </p:spTgt>
-                                        </p:tgtEl>
-                                        <p:attrNameLst>
-                                          <p:attrName>style.visibility</p:attrName>
-                                        </p:attrNameLst>
-                                      </p:cBhvr>
-                                      <p:to>
-                                        <p:strVal val="visible"/>
-                                      </p:to>
-                                    </p:set>
-                                  </p:childTnLst>
-                                </p:cTn>
-                              </p:par>
-                              <p:par>
-                                <p:cTn id="15" presetID="1" presetClass="entr" presetSubtype="0" fill="hold" grpId="0" nodeType="withEffect">
-                                  <p:stCondLst>
-                                    <p:cond delay="0"/>
-                                  </p:stCondLst>
-                                  <p:childTnLst>
-                                    <p:set>
-                                      <p:cBhvr>
-                                        <p:cTn id="16" dur="1" fill="hold">
-                                          <p:stCondLst>
-                                            <p:cond delay="0"/>
-                                          </p:stCondLst>
-                                        </p:cTn>
-                                        <p:tgtEl>
-                                          <p:spTgt spid="6">
-                                            <p:txEl>
-                                              <p:pRg st="7" end="7"/>
-                                            </p:txEl>
-                                          </p:spTgt>
-                                        </p:tgtEl>
-                                        <p:attrNameLst>
-                                          <p:attrName>style.visibility</p:attrName>
-                                        </p:attrNameLst>
-                                      </p:cBhvr>
-                                      <p:to>
-                                        <p:strVal val="visible"/>
-                                      </p:to>
-                                    </p:set>
-                                  </p:childTnLst>
-                                </p:cTn>
-                              </p:par>
-                              <p:par>
-                                <p:cTn id="17" presetID="1" presetClass="entr" presetSubtype="0" fill="hold" grpId="0" nodeType="withEffect">
-                                  <p:stCondLst>
-                                    <p:cond delay="0"/>
-                                  </p:stCondLst>
-                                  <p:childTnLst>
-                                    <p:set>
-                                      <p:cBhvr>
-                                        <p:cTn id="18" dur="1" fill="hold">
-                                          <p:stCondLst>
-                                            <p:cond delay="0"/>
-                                          </p:stCondLst>
-                                        </p:cTn>
-                                        <p:tgtEl>
-                                          <p:spTgt spid="6">
-                                            <p:txEl>
-                                              <p:pRg st="8" end="8"/>
-                                            </p:txEl>
-                                          </p:spTgt>
-                                        </p:tgtEl>
-                                        <p:attrNameLst>
-                                          <p:attrName>style.visibility</p:attrName>
-                                        </p:attrNameLst>
-                                      </p:cBhvr>
-                                      <p:to>
-                                        <p:strVal val="visible"/>
-                                      </p:to>
-                                    </p:set>
-                                  </p:childTnLst>
-                                </p:cTn>
-                              </p:par>
-                              <p:par>
-                                <p:cTn id="19" presetID="1" presetClass="entr" presetSubtype="0" fill="hold" grpId="0" nodeType="withEffect">
-                                  <p:stCondLst>
-                                    <p:cond delay="0"/>
-                                  </p:stCondLst>
-                                  <p:childTnLst>
-                                    <p:set>
-                                      <p:cBhvr>
-                                        <p:cTn id="20" dur="1" fill="hold">
-                                          <p:stCondLst>
-                                            <p:cond delay="0"/>
-                                          </p:stCondLst>
-                                        </p:cTn>
-                                        <p:tgtEl>
-                                          <p:spTgt spid="6">
-                                            <p:txEl>
-                                              <p:pRg st="9" end="9"/>
-                                            </p:txEl>
-                                          </p:spTgt>
-                                        </p:tgtEl>
-                                        <p:attrNameLst>
-                                          <p:attrName>style.visibility</p:attrName>
-                                        </p:attrNameLst>
-                                      </p:cBhvr>
-                                      <p:to>
-                                        <p:strVal val="visible"/>
-                                      </p:to>
-                                    </p:set>
-                                  </p:childTnLst>
-                                </p:cTn>
-                              </p:par>
-                            </p:childTnLst>
-                          </p:cTn>
-                        </p:par>
-                      </p:childTnLst>
-                    </p:cTn>
-                  </p:par>
-                </p:childTnLst>
-              </p:cTn>
-              <p:prevCondLst>
-                <p:cond evt="onPrev" delay="0">
-                  <p:tgtEl>
-                    <p:sldTgt/>
-                  </p:tgtEl>
-                </p:cond>
-              </p:prevCondLst>
-              <p:nextCondLst>
-                <p:cond evt="onNext" delay="0">
-                  <p:tgtEl>
-                    <p:sldTgt/>
-                  </p:tgtEl>
-                </p:cond>
-              </p:nextCondLst>
-            </p:seq>
-          </p:childTnLst>
-        </p:cTn>
-      </p:par>
-    </p:tnLst>
-    <p:bldLst>
-      <p:bldP spid="6" grpId="0" uiExpand="1" build="p"/>
-    </p:bldLst>
-  </p:timing>
-</p:sld>
-</file>
-
 <file path=ppt/slides/slide4.xml><?xml version="1.0" encoding="utf-8"?>
 <p:sld xmlns:a="http://schemas.openxmlformats.org/drawingml/2006/main" xmlns:r="http://schemas.openxmlformats.org/officeDocument/2006/relationships" xmlns:p="http://schemas.openxmlformats.org/presentationml/2006/main">
   <p:cSld>
@@ -24404,6 +24188,558 @@
       </p:grpSpPr>
       <p:sp>
         <p:nvSpPr>
+          <p:cNvPr id="4" name="Title 3"/>
+          <p:cNvSpPr>
+            <a:spLocks noGrp="1"/>
+          </p:cNvSpPr>
+          <p:nvPr>
+            <p:ph type="ctrTitle"/>
+          </p:nvPr>
+        </p:nvSpPr>
+        <p:spPr/>
+        <p:txBody>
+          <a:bodyPr/>
+          <a:lstStyle/>
+          <a:p>
+            <a:r>
+              <a:rPr lang="en-US" b="1" dirty="0"/>
+              <a:t>Alignment and Borders</a:t>
+            </a:r>
+          </a:p>
+        </p:txBody>
+      </p:sp>
+    </p:spTree>
+    <p:extLst>
+      <p:ext uri="{BB962C8B-B14F-4D97-AF65-F5344CB8AC3E}">
+        <p14:creationId xmlns:p14="http://schemas.microsoft.com/office/powerpoint/2010/main" val="2727587897"/>
+      </p:ext>
+    </p:extLst>
+  </p:cSld>
+  <p:clrMapOvr>
+    <a:masterClrMapping/>
+  </p:clrMapOvr>
+</p:sld>
+</file>
+
+<file path=ppt/slides/slide41.xml><?xml version="1.0" encoding="utf-8"?>
+<p:sld xmlns:a="http://schemas.openxmlformats.org/drawingml/2006/main" xmlns:r="http://schemas.openxmlformats.org/officeDocument/2006/relationships" xmlns:p="http://schemas.openxmlformats.org/presentationml/2006/main">
+  <p:cSld>
+    <p:spTree>
+      <p:nvGrpSpPr>
+        <p:cNvPr id="1" name=""/>
+        <p:cNvGrpSpPr/>
+        <p:nvPr/>
+      </p:nvGrpSpPr>
+      <p:grpSpPr>
+        <a:xfrm>
+          <a:off x="0" y="0"/>
+          <a:ext cx="0" cy="0"/>
+          <a:chOff x="0" y="0"/>
+          <a:chExt cx="0" cy="0"/>
+        </a:xfrm>
+      </p:grpSpPr>
+      <p:sp>
+        <p:nvSpPr>
+          <p:cNvPr id="21506" name="Text Box 3"/>
+          <p:cNvSpPr txBox="1">
+            <a:spLocks noChangeArrowheads="1"/>
+          </p:cNvSpPr>
+          <p:nvPr/>
+        </p:nvSpPr>
+        <p:spPr bwMode="auto">
+          <a:xfrm>
+            <a:off x="1422400" y="857250"/>
+            <a:ext cx="184731" cy="341632"/>
+          </a:xfrm>
+          <a:prstGeom prst="rect">
+            <a:avLst/>
+          </a:prstGeom>
+          <a:noFill/>
+          <a:ln w="12700">
+            <a:noFill/>
+            <a:miter lim="800000"/>
+            <a:headEnd/>
+            <a:tailEnd/>
+          </a:ln>
+        </p:spPr>
+        <p:txBody>
+          <a:bodyPr wrap="none">
+            <a:spAutoFit/>
+          </a:bodyPr>
+          <a:lstStyle/>
+          <a:p>
+            <a:endParaRPr lang="en-US"/>
+          </a:p>
+        </p:txBody>
+      </p:sp>
+      <p:sp>
+        <p:nvSpPr>
+          <p:cNvPr id="5" name="Title 4"/>
+          <p:cNvSpPr>
+            <a:spLocks noGrp="1"/>
+          </p:cNvSpPr>
+          <p:nvPr>
+            <p:ph type="title"/>
+          </p:nvPr>
+        </p:nvSpPr>
+        <p:spPr/>
+        <p:txBody>
+          <a:bodyPr/>
+          <a:lstStyle/>
+          <a:p>
+            <a:r>
+              <a:rPr lang="en-US" dirty="0"/>
+              <a:t>Alignment of Text</a:t>
+            </a:r>
+          </a:p>
+        </p:txBody>
+      </p:sp>
+      <p:sp>
+        <p:nvSpPr>
+          <p:cNvPr id="6" name="Content Placeholder 5"/>
+          <p:cNvSpPr>
+            <a:spLocks noGrp="1"/>
+          </p:cNvSpPr>
+          <p:nvPr>
+            <p:ph idx="1"/>
+          </p:nvPr>
+        </p:nvSpPr>
+        <p:spPr>
+          <a:xfrm>
+            <a:off x="685800" y="1219200"/>
+            <a:ext cx="7772400" cy="4953000"/>
+          </a:xfrm>
+        </p:spPr>
+        <p:txBody>
+          <a:bodyPr>
+            <a:normAutofit/>
+          </a:bodyPr>
+          <a:lstStyle/>
+          <a:p>
+            <a:r>
+              <a:rPr lang="en-US" dirty="0"/>
+              <a:t>There are several ways of aligning text and other elements:</a:t>
+            </a:r>
+          </a:p>
+          <a:p>
+            <a:endParaRPr lang="en-US" dirty="0"/>
+          </a:p>
+          <a:p>
+            <a:r>
+              <a:rPr lang="en-US" dirty="0"/>
+              <a:t>The </a:t>
+            </a:r>
+            <a:r>
+              <a:rPr lang="en-US" sz="2800" dirty="0">
+                <a:latin typeface="Courier New" pitchFamily="49" charset="0"/>
+              </a:rPr>
+              <a:t>text-indent</a:t>
+            </a:r>
+            <a:r>
+              <a:rPr lang="en-US" dirty="0"/>
+              <a:t> property allows indentation </a:t>
+            </a:r>
+          </a:p>
+          <a:p>
+            <a:pPr lvl="1"/>
+            <a:r>
+              <a:rPr lang="en-US" dirty="0"/>
+              <a:t>Takes either a length or a % value</a:t>
+            </a:r>
+          </a:p>
+          <a:p>
+            <a:endParaRPr lang="en-US" dirty="0"/>
+          </a:p>
+          <a:p>
+            <a:r>
+              <a:rPr lang="en-US" dirty="0"/>
+              <a:t>The </a:t>
+            </a:r>
+            <a:r>
+              <a:rPr lang="en-US" sz="2800" dirty="0">
+                <a:latin typeface="Courier New" pitchFamily="49" charset="0"/>
+              </a:rPr>
+              <a:t>text-align</a:t>
+            </a:r>
+            <a:r>
+              <a:rPr lang="en-US" dirty="0"/>
+              <a:t> property has the possible values:</a:t>
+            </a:r>
+          </a:p>
+          <a:p>
+            <a:pPr lvl="1">
+              <a:buFont typeface="Arial" panose="020B0604020202020204" pitchFamily="34" charset="0"/>
+              <a:buChar char="•"/>
+            </a:pPr>
+            <a:r>
+              <a:rPr lang="en-US" sz="2400" dirty="0">
+                <a:latin typeface="Courier New" pitchFamily="49" charset="0"/>
+              </a:rPr>
+              <a:t>left</a:t>
+            </a:r>
+            <a:r>
+              <a:rPr lang="en-US" dirty="0"/>
+              <a:t> (the default)</a:t>
+            </a:r>
+          </a:p>
+          <a:p>
+            <a:pPr lvl="1">
+              <a:buFont typeface="Arial" panose="020B0604020202020204" pitchFamily="34" charset="0"/>
+              <a:buChar char="•"/>
+            </a:pPr>
+            <a:r>
+              <a:rPr lang="en-US" sz="2400" dirty="0">
+                <a:latin typeface="Courier New" pitchFamily="49" charset="0"/>
+              </a:rPr>
+              <a:t>center</a:t>
+            </a:r>
+            <a:endParaRPr lang="en-US" dirty="0"/>
+          </a:p>
+          <a:p>
+            <a:pPr lvl="1">
+              <a:buFont typeface="Arial" panose="020B0604020202020204" pitchFamily="34" charset="0"/>
+              <a:buChar char="•"/>
+            </a:pPr>
+            <a:r>
+              <a:rPr lang="en-US" sz="2400" dirty="0">
+                <a:latin typeface="Courier New" pitchFamily="49" charset="0"/>
+              </a:rPr>
+              <a:t>right</a:t>
+            </a:r>
+            <a:endParaRPr lang="en-US" dirty="0"/>
+          </a:p>
+          <a:p>
+            <a:pPr lvl="1">
+              <a:buFont typeface="Arial" panose="020B0604020202020204" pitchFamily="34" charset="0"/>
+              <a:buChar char="•"/>
+            </a:pPr>
+            <a:r>
+              <a:rPr lang="en-US" sz="2400" dirty="0">
+                <a:latin typeface="Courier New" pitchFamily="49" charset="0"/>
+              </a:rPr>
+              <a:t>justify</a:t>
+            </a:r>
+          </a:p>
+        </p:txBody>
+      </p:sp>
+    </p:spTree>
+    <p:extLst>
+      <p:ext uri="{BB962C8B-B14F-4D97-AF65-F5344CB8AC3E}">
+        <p14:creationId xmlns:p14="http://schemas.microsoft.com/office/powerpoint/2010/main" val="1243426832"/>
+      </p:ext>
+    </p:extLst>
+  </p:cSld>
+  <p:clrMapOvr>
+    <a:masterClrMapping/>
+  </p:clrMapOvr>
+  <p:timing>
+    <p:tnLst>
+      <p:par>
+        <p:cTn id="1" dur="indefinite" restart="never" nodeType="tmRoot">
+          <p:childTnLst>
+            <p:seq concurrent="1" nextAc="seek">
+              <p:cTn id="2" dur="indefinite" nodeType="mainSeq">
+                <p:childTnLst>
+                  <p:par>
+                    <p:cTn id="3" fill="hold">
+                      <p:stCondLst>
+                        <p:cond delay="indefinite"/>
+                      </p:stCondLst>
+                      <p:childTnLst>
+                        <p:par>
+                          <p:cTn id="4" fill="hold">
+                            <p:stCondLst>
+                              <p:cond delay="0"/>
+                            </p:stCondLst>
+                            <p:childTnLst>
+                              <p:par>
+                                <p:cTn id="5" presetID="1" presetClass="entr" presetSubtype="0" fill="hold" grpId="0" nodeType="clickEffect">
+                                  <p:stCondLst>
+                                    <p:cond delay="0"/>
+                                  </p:stCondLst>
+                                  <p:childTnLst>
+                                    <p:set>
+                                      <p:cBhvr>
+                                        <p:cTn id="6" dur="1" fill="hold">
+                                          <p:stCondLst>
+                                            <p:cond delay="0"/>
+                                          </p:stCondLst>
+                                        </p:cTn>
+                                        <p:tgtEl>
+                                          <p:spTgt spid="6">
+                                            <p:txEl>
+                                              <p:pRg st="2" end="2"/>
+                                            </p:txEl>
+                                          </p:spTgt>
+                                        </p:tgtEl>
+                                        <p:attrNameLst>
+                                          <p:attrName>style.visibility</p:attrName>
+                                        </p:attrNameLst>
+                                      </p:cBhvr>
+                                      <p:to>
+                                        <p:strVal val="visible"/>
+                                      </p:to>
+                                    </p:set>
+                                  </p:childTnLst>
+                                </p:cTn>
+                              </p:par>
+                              <p:par>
+                                <p:cTn id="7" presetID="1" presetClass="entr" presetSubtype="0" fill="hold" grpId="0" nodeType="withEffect">
+                                  <p:stCondLst>
+                                    <p:cond delay="0"/>
+                                  </p:stCondLst>
+                                  <p:childTnLst>
+                                    <p:set>
+                                      <p:cBhvr>
+                                        <p:cTn id="8" dur="1" fill="hold">
+                                          <p:stCondLst>
+                                            <p:cond delay="0"/>
+                                          </p:stCondLst>
+                                        </p:cTn>
+                                        <p:tgtEl>
+                                          <p:spTgt spid="6">
+                                            <p:txEl>
+                                              <p:pRg st="3" end="3"/>
+                                            </p:txEl>
+                                          </p:spTgt>
+                                        </p:tgtEl>
+                                        <p:attrNameLst>
+                                          <p:attrName>style.visibility</p:attrName>
+                                        </p:attrNameLst>
+                                      </p:cBhvr>
+                                      <p:to>
+                                        <p:strVal val="visible"/>
+                                      </p:to>
+                                    </p:set>
+                                  </p:childTnLst>
+                                </p:cTn>
+                              </p:par>
+                            </p:childTnLst>
+                          </p:cTn>
+                        </p:par>
+                      </p:childTnLst>
+                    </p:cTn>
+                  </p:par>
+                  <p:par>
+                    <p:cTn id="9" fill="hold">
+                      <p:stCondLst>
+                        <p:cond delay="indefinite"/>
+                      </p:stCondLst>
+                      <p:childTnLst>
+                        <p:par>
+                          <p:cTn id="10" fill="hold">
+                            <p:stCondLst>
+                              <p:cond delay="0"/>
+                            </p:stCondLst>
+                            <p:childTnLst>
+                              <p:par>
+                                <p:cTn id="11" presetID="1" presetClass="entr" presetSubtype="0" fill="hold" grpId="0" nodeType="clickEffect">
+                                  <p:stCondLst>
+                                    <p:cond delay="0"/>
+                                  </p:stCondLst>
+                                  <p:childTnLst>
+                                    <p:set>
+                                      <p:cBhvr>
+                                        <p:cTn id="12" dur="1" fill="hold">
+                                          <p:stCondLst>
+                                            <p:cond delay="0"/>
+                                          </p:stCondLst>
+                                        </p:cTn>
+                                        <p:tgtEl>
+                                          <p:spTgt spid="6">
+                                            <p:txEl>
+                                              <p:pRg st="5" end="5"/>
+                                            </p:txEl>
+                                          </p:spTgt>
+                                        </p:tgtEl>
+                                        <p:attrNameLst>
+                                          <p:attrName>style.visibility</p:attrName>
+                                        </p:attrNameLst>
+                                      </p:cBhvr>
+                                      <p:to>
+                                        <p:strVal val="visible"/>
+                                      </p:to>
+                                    </p:set>
+                                  </p:childTnLst>
+                                </p:cTn>
+                              </p:par>
+                              <p:par>
+                                <p:cTn id="13" presetID="1" presetClass="entr" presetSubtype="0" fill="hold" grpId="0" nodeType="withEffect">
+                                  <p:stCondLst>
+                                    <p:cond delay="0"/>
+                                  </p:stCondLst>
+                                  <p:childTnLst>
+                                    <p:set>
+                                      <p:cBhvr>
+                                        <p:cTn id="14" dur="1" fill="hold">
+                                          <p:stCondLst>
+                                            <p:cond delay="0"/>
+                                          </p:stCondLst>
+                                        </p:cTn>
+                                        <p:tgtEl>
+                                          <p:spTgt spid="6">
+                                            <p:txEl>
+                                              <p:pRg st="6" end="6"/>
+                                            </p:txEl>
+                                          </p:spTgt>
+                                        </p:tgtEl>
+                                        <p:attrNameLst>
+                                          <p:attrName>style.visibility</p:attrName>
+                                        </p:attrNameLst>
+                                      </p:cBhvr>
+                                      <p:to>
+                                        <p:strVal val="visible"/>
+                                      </p:to>
+                                    </p:set>
+                                  </p:childTnLst>
+                                </p:cTn>
+                              </p:par>
+                              <p:par>
+                                <p:cTn id="15" presetID="1" presetClass="entr" presetSubtype="0" fill="hold" grpId="0" nodeType="withEffect">
+                                  <p:stCondLst>
+                                    <p:cond delay="0"/>
+                                  </p:stCondLst>
+                                  <p:childTnLst>
+                                    <p:set>
+                                      <p:cBhvr>
+                                        <p:cTn id="16" dur="1" fill="hold">
+                                          <p:stCondLst>
+                                            <p:cond delay="0"/>
+                                          </p:stCondLst>
+                                        </p:cTn>
+                                        <p:tgtEl>
+                                          <p:spTgt spid="6">
+                                            <p:txEl>
+                                              <p:pRg st="7" end="7"/>
+                                            </p:txEl>
+                                          </p:spTgt>
+                                        </p:tgtEl>
+                                        <p:attrNameLst>
+                                          <p:attrName>style.visibility</p:attrName>
+                                        </p:attrNameLst>
+                                      </p:cBhvr>
+                                      <p:to>
+                                        <p:strVal val="visible"/>
+                                      </p:to>
+                                    </p:set>
+                                  </p:childTnLst>
+                                </p:cTn>
+                              </p:par>
+                              <p:par>
+                                <p:cTn id="17" presetID="1" presetClass="entr" presetSubtype="0" fill="hold" grpId="0" nodeType="withEffect">
+                                  <p:stCondLst>
+                                    <p:cond delay="0"/>
+                                  </p:stCondLst>
+                                  <p:childTnLst>
+                                    <p:set>
+                                      <p:cBhvr>
+                                        <p:cTn id="18" dur="1" fill="hold">
+                                          <p:stCondLst>
+                                            <p:cond delay="0"/>
+                                          </p:stCondLst>
+                                        </p:cTn>
+                                        <p:tgtEl>
+                                          <p:spTgt spid="6">
+                                            <p:txEl>
+                                              <p:pRg st="8" end="8"/>
+                                            </p:txEl>
+                                          </p:spTgt>
+                                        </p:tgtEl>
+                                        <p:attrNameLst>
+                                          <p:attrName>style.visibility</p:attrName>
+                                        </p:attrNameLst>
+                                      </p:cBhvr>
+                                      <p:to>
+                                        <p:strVal val="visible"/>
+                                      </p:to>
+                                    </p:set>
+                                  </p:childTnLst>
+                                </p:cTn>
+                              </p:par>
+                              <p:par>
+                                <p:cTn id="19" presetID="1" presetClass="entr" presetSubtype="0" fill="hold" grpId="0" nodeType="withEffect">
+                                  <p:stCondLst>
+                                    <p:cond delay="0"/>
+                                  </p:stCondLst>
+                                  <p:childTnLst>
+                                    <p:set>
+                                      <p:cBhvr>
+                                        <p:cTn id="20" dur="1" fill="hold">
+                                          <p:stCondLst>
+                                            <p:cond delay="0"/>
+                                          </p:stCondLst>
+                                        </p:cTn>
+                                        <p:tgtEl>
+                                          <p:spTgt spid="6">
+                                            <p:txEl>
+                                              <p:pRg st="9" end="9"/>
+                                            </p:txEl>
+                                          </p:spTgt>
+                                        </p:tgtEl>
+                                        <p:attrNameLst>
+                                          <p:attrName>style.visibility</p:attrName>
+                                        </p:attrNameLst>
+                                      </p:cBhvr>
+                                      <p:to>
+                                        <p:strVal val="visible"/>
+                                      </p:to>
+                                    </p:set>
+                                  </p:childTnLst>
+                                </p:cTn>
+                              </p:par>
+                            </p:childTnLst>
+                          </p:cTn>
+                        </p:par>
+                      </p:childTnLst>
+                    </p:cTn>
+                  </p:par>
+                </p:childTnLst>
+              </p:cTn>
+              <p:prevCondLst>
+                <p:cond evt="onPrev" delay="0">
+                  <p:tgtEl>
+                    <p:sldTgt/>
+                  </p:tgtEl>
+                </p:cond>
+              </p:prevCondLst>
+              <p:nextCondLst>
+                <p:cond evt="onNext" delay="0">
+                  <p:tgtEl>
+                    <p:sldTgt/>
+                  </p:tgtEl>
+                </p:cond>
+              </p:nextCondLst>
+            </p:seq>
+          </p:childTnLst>
+        </p:cTn>
+      </p:par>
+    </p:tnLst>
+    <p:bldLst>
+      <p:bldP spid="6" grpId="0" uiExpand="1" build="p"/>
+    </p:bldLst>
+  </p:timing>
+</p:sld>
+</file>
+
+<file path=ppt/slides/slide42.xml><?xml version="1.0" encoding="utf-8"?>
+<p:sld xmlns:a="http://schemas.openxmlformats.org/drawingml/2006/main" xmlns:r="http://schemas.openxmlformats.org/officeDocument/2006/relationships" xmlns:p="http://schemas.openxmlformats.org/presentationml/2006/main">
+  <p:cSld>
+    <p:spTree>
+      <p:nvGrpSpPr>
+        <p:cNvPr id="1" name=""/>
+        <p:cNvGrpSpPr/>
+        <p:nvPr/>
+      </p:nvGrpSpPr>
+      <p:grpSpPr>
+        <a:xfrm>
+          <a:off x="0" y="0"/>
+          <a:ext cx="0" cy="0"/>
+          <a:chOff x="0" y="0"/>
+          <a:chExt cx="0" cy="0"/>
+        </a:xfrm>
+      </p:grpSpPr>
+      <p:sp>
+        <p:nvSpPr>
           <p:cNvPr id="21506" name="Text Box 3"/>
           <p:cNvSpPr txBox="1">
             <a:spLocks noChangeArrowheads="1"/>
@@ -24875,7 +25211,7 @@
 </p:sld>
 </file>
 
-<file path=ppt/slides/slide41.xml><?xml version="1.0" encoding="utf-8"?>
+<file path=ppt/slides/slide43.xml><?xml version="1.0" encoding="utf-8"?>
 <p:sld xmlns:a="http://schemas.openxmlformats.org/drawingml/2006/main" xmlns:r="http://schemas.openxmlformats.org/officeDocument/2006/relationships" xmlns:p="http://schemas.openxmlformats.org/presentationml/2006/main">
   <p:cSld>
     <p:spTree>
@@ -25410,7 +25746,7 @@
 </p:sld>
 </file>
 
-<file path=ppt/slides/slide42.xml><?xml version="1.0" encoding="utf-8"?>
+<file path=ppt/slides/slide44.xml><?xml version="1.0" encoding="utf-8"?>
 <p:sld xmlns:a="http://schemas.openxmlformats.org/drawingml/2006/main" xmlns:r="http://schemas.openxmlformats.org/officeDocument/2006/relationships" xmlns:p="http://schemas.openxmlformats.org/presentationml/2006/main">
   <p:cSld>
     <p:spTree>
@@ -25530,7 +25866,7 @@
 </p:sld>
 </file>
 
-<file path=ppt/slides/slide43.xml><?xml version="1.0" encoding="utf-8"?>
+<file path=ppt/slides/slide45.xml><?xml version="1.0" encoding="utf-8"?>
 <p:sld xmlns:a="http://schemas.openxmlformats.org/drawingml/2006/main" xmlns:r="http://schemas.openxmlformats.org/officeDocument/2006/relationships" xmlns:p="http://schemas.openxmlformats.org/presentationml/2006/main">
   <p:cSld>
     <p:spTree>
@@ -25582,7 +25918,7 @@
 </p:sld>
 </file>
 
-<file path=ppt/slides/slide44.xml><?xml version="1.0" encoding="utf-8"?>
+<file path=ppt/slides/slide46.xml><?xml version="1.0" encoding="utf-8"?>
 <p:sld xmlns:a="http://schemas.openxmlformats.org/drawingml/2006/main" xmlns:r="http://schemas.openxmlformats.org/officeDocument/2006/relationships" xmlns:p="http://schemas.openxmlformats.org/presentationml/2006/main">
   <p:cSld>
     <p:spTree>
@@ -25846,7 +26182,7 @@
 </p:sld>
 </file>
 
-<file path=ppt/slides/slide45.xml><?xml version="1.0" encoding="utf-8"?>
+<file path=ppt/slides/slide47.xml><?xml version="1.0" encoding="utf-8"?>
 <p:sld xmlns:a="http://schemas.openxmlformats.org/drawingml/2006/main" xmlns:r="http://schemas.openxmlformats.org/officeDocument/2006/relationships" xmlns:p="http://schemas.openxmlformats.org/presentationml/2006/main">
   <p:cSld>
     <p:spTree>
@@ -26356,7 +26692,7 @@
 </p:sld>
 </file>
 
-<file path=ppt/slides/slide46.xml><?xml version="1.0" encoding="utf-8"?>
+<file path=ppt/slides/slide48.xml><?xml version="1.0" encoding="utf-8"?>
 <p:sld xmlns:a="http://schemas.openxmlformats.org/drawingml/2006/main" xmlns:r="http://schemas.openxmlformats.org/officeDocument/2006/relationships" xmlns:p="http://schemas.openxmlformats.org/presentationml/2006/main">
   <p:cSld>
     <p:spTree>
@@ -26482,7 +26818,7 @@
 </p:sld>
 </file>
 
-<file path=ppt/slides/slide47.xml><?xml version="1.0" encoding="utf-8"?>
+<file path=ppt/slides/slide49.xml><?xml version="1.0" encoding="utf-8"?>
 <p:sld xmlns:a="http://schemas.openxmlformats.org/drawingml/2006/main" xmlns:r="http://schemas.openxmlformats.org/officeDocument/2006/relationships" xmlns:p="http://schemas.openxmlformats.org/presentationml/2006/main">
   <p:cSld>
     <p:spTree>
@@ -26531,586 +26867,6 @@
   <p:clrMapOvr>
     <a:masterClrMapping/>
   </p:clrMapOvr>
-</p:sld>
-</file>
-
-<file path=ppt/slides/slide48.xml><?xml version="1.0" encoding="utf-8"?>
-<p:sld xmlns:a="http://schemas.openxmlformats.org/drawingml/2006/main" xmlns:r="http://schemas.openxmlformats.org/officeDocument/2006/relationships" xmlns:p="http://schemas.openxmlformats.org/presentationml/2006/main">
-  <p:cSld>
-    <p:spTree>
-      <p:nvGrpSpPr>
-        <p:cNvPr id="1" name=""/>
-        <p:cNvGrpSpPr/>
-        <p:nvPr/>
-      </p:nvGrpSpPr>
-      <p:grpSpPr>
-        <a:xfrm>
-          <a:off x="0" y="0"/>
-          <a:ext cx="0" cy="0"/>
-          <a:chOff x="0" y="0"/>
-          <a:chExt cx="0" cy="0"/>
-        </a:xfrm>
-      </p:grpSpPr>
-      <p:sp>
-        <p:nvSpPr>
-          <p:cNvPr id="4" name="Title 3"/>
-          <p:cNvSpPr>
-            <a:spLocks noGrp="1"/>
-          </p:cNvSpPr>
-          <p:nvPr>
-            <p:ph type="title"/>
-          </p:nvPr>
-        </p:nvSpPr>
-        <p:spPr/>
-        <p:txBody>
-          <a:bodyPr/>
-          <a:lstStyle/>
-          <a:p>
-            <a:r>
-              <a:rPr lang="en-US" dirty="0"/>
-              <a:t>The &lt;span&gt;  tag</a:t>
-            </a:r>
-          </a:p>
-        </p:txBody>
-      </p:sp>
-      <p:sp>
-        <p:nvSpPr>
-          <p:cNvPr id="5" name="Content Placeholder 4"/>
-          <p:cNvSpPr>
-            <a:spLocks noGrp="1"/>
-          </p:cNvSpPr>
-          <p:nvPr>
-            <p:ph idx="1"/>
-          </p:nvPr>
-        </p:nvSpPr>
-        <p:spPr>
-          <a:xfrm>
-            <a:off x="685800" y="1219200"/>
-            <a:ext cx="7772400" cy="4495800"/>
-          </a:xfrm>
-        </p:spPr>
-        <p:txBody>
-          <a:bodyPr>
-            <a:normAutofit/>
-          </a:bodyPr>
-          <a:lstStyle/>
-          <a:p>
-            <a:r>
-              <a:rPr lang="en-US" sz="2300" dirty="0"/>
-              <a:t>One problem with the font properties is that they apply to whole elements, which are often too large</a:t>
-            </a:r>
-          </a:p>
-          <a:p>
-            <a:endParaRPr lang="en-US" sz="2300" dirty="0"/>
-          </a:p>
-          <a:p>
-            <a:r>
-              <a:rPr lang="en-US" sz="2300" dirty="0"/>
-              <a:t>Solution: a new tag to define an element in the content of a larger element - </a:t>
-            </a:r>
-            <a:r>
-              <a:rPr lang="en-US" sz="2300" b="1" dirty="0">
-                <a:solidFill>
-                  <a:srgbClr val="FF0000"/>
-                </a:solidFill>
-                <a:latin typeface="Courier New" pitchFamily="49" charset="0"/>
-              </a:rPr>
-              <a:t>&lt;span&gt;</a:t>
-            </a:r>
-            <a:endParaRPr lang="en-US" sz="2300" b="1" dirty="0">
-              <a:solidFill>
-                <a:srgbClr val="FF0000"/>
-              </a:solidFill>
-            </a:endParaRPr>
-          </a:p>
-          <a:p>
-            <a:endParaRPr lang="en-US" sz="2300" dirty="0"/>
-          </a:p>
-          <a:p>
-            <a:r>
-              <a:rPr lang="en-US" sz="2300" dirty="0"/>
-              <a:t>The default meaning of </a:t>
-            </a:r>
-            <a:r>
-              <a:rPr lang="en-US" sz="2300" dirty="0">
-                <a:latin typeface="Courier New" pitchFamily="49" charset="0"/>
-              </a:rPr>
-              <a:t>&lt;span&gt;</a:t>
-            </a:r>
-            <a:r>
-              <a:rPr lang="en-US" sz="2300" dirty="0"/>
-              <a:t> is to leave the content as it is</a:t>
-            </a:r>
-          </a:p>
-          <a:p>
-            <a:endParaRPr lang="en-US" sz="2300" dirty="0"/>
-          </a:p>
-          <a:p>
-            <a:r>
-              <a:rPr lang="en-US" sz="2300" dirty="0"/>
-              <a:t>The </a:t>
-            </a:r>
-            <a:r>
-              <a:rPr lang="en-US" sz="2300" dirty="0">
-                <a:latin typeface="Courier New" pitchFamily="49" charset="0"/>
-              </a:rPr>
-              <a:t>&lt;span&gt;</a:t>
-            </a:r>
-            <a:r>
-              <a:rPr lang="en-US" sz="2300" dirty="0"/>
-              <a:t> tag can be nested and have </a:t>
-            </a:r>
-            <a:r>
-              <a:rPr lang="en-US" sz="2300" dirty="0">
-                <a:latin typeface="Courier New" pitchFamily="49" charset="0"/>
-              </a:rPr>
-              <a:t>id</a:t>
-            </a:r>
-            <a:r>
-              <a:rPr lang="en-US" sz="2300" dirty="0"/>
-              <a:t> and </a:t>
-            </a:r>
-            <a:r>
-              <a:rPr lang="en-US" sz="2300" dirty="0">
-                <a:latin typeface="Courier New" pitchFamily="49" charset="0"/>
-              </a:rPr>
-              <a:t>class</a:t>
-            </a:r>
-            <a:r>
-              <a:rPr lang="en-US" sz="2300" dirty="0"/>
-              <a:t>   attributes</a:t>
-            </a:r>
-          </a:p>
-          <a:p>
-            <a:endParaRPr lang="en-US" dirty="0"/>
-          </a:p>
-          <a:p>
-            <a:endParaRPr lang="en-US" dirty="0"/>
-          </a:p>
-          <a:p>
-            <a:endParaRPr lang="en-US" dirty="0">
-              <a:latin typeface="Courier New" pitchFamily="49" charset="0"/>
-              <a:cs typeface="Courier New" pitchFamily="49" charset="0"/>
-            </a:endParaRPr>
-          </a:p>
-        </p:txBody>
-      </p:sp>
-    </p:spTree>
-    <p:extLst>
-      <p:ext uri="{BB962C8B-B14F-4D97-AF65-F5344CB8AC3E}">
-        <p14:creationId xmlns:p14="http://schemas.microsoft.com/office/powerpoint/2010/main" val="253971723"/>
-      </p:ext>
-    </p:extLst>
-  </p:cSld>
-  <p:clrMapOvr>
-    <a:masterClrMapping/>
-  </p:clrMapOvr>
-  <p:timing>
-    <p:tnLst>
-      <p:par>
-        <p:cTn id="1" dur="indefinite" restart="never" nodeType="tmRoot">
-          <p:childTnLst>
-            <p:seq concurrent="1" nextAc="seek">
-              <p:cTn id="2" dur="indefinite" nodeType="mainSeq">
-                <p:childTnLst>
-                  <p:par>
-                    <p:cTn id="3" fill="hold">
-                      <p:stCondLst>
-                        <p:cond delay="indefinite"/>
-                      </p:stCondLst>
-                      <p:childTnLst>
-                        <p:par>
-                          <p:cTn id="4" fill="hold">
-                            <p:stCondLst>
-                              <p:cond delay="0"/>
-                            </p:stCondLst>
-                            <p:childTnLst>
-                              <p:par>
-                                <p:cTn id="5" presetID="1" presetClass="entr" presetSubtype="0" fill="hold" grpId="0" nodeType="clickEffect">
-                                  <p:stCondLst>
-                                    <p:cond delay="0"/>
-                                  </p:stCondLst>
-                                  <p:childTnLst>
-                                    <p:set>
-                                      <p:cBhvr>
-                                        <p:cTn id="6" dur="1" fill="hold">
-                                          <p:stCondLst>
-                                            <p:cond delay="0"/>
-                                          </p:stCondLst>
-                                        </p:cTn>
-                                        <p:tgtEl>
-                                          <p:spTgt spid="5">
-                                            <p:txEl>
-                                              <p:pRg st="2" end="2"/>
-                                            </p:txEl>
-                                          </p:spTgt>
-                                        </p:tgtEl>
-                                        <p:attrNameLst>
-                                          <p:attrName>style.visibility</p:attrName>
-                                        </p:attrNameLst>
-                                      </p:cBhvr>
-                                      <p:to>
-                                        <p:strVal val="visible"/>
-                                      </p:to>
-                                    </p:set>
-                                  </p:childTnLst>
-                                </p:cTn>
-                              </p:par>
-                            </p:childTnLst>
-                          </p:cTn>
-                        </p:par>
-                      </p:childTnLst>
-                    </p:cTn>
-                  </p:par>
-                  <p:par>
-                    <p:cTn id="7" fill="hold">
-                      <p:stCondLst>
-                        <p:cond delay="indefinite"/>
-                      </p:stCondLst>
-                      <p:childTnLst>
-                        <p:par>
-                          <p:cTn id="8" fill="hold">
-                            <p:stCondLst>
-                              <p:cond delay="0"/>
-                            </p:stCondLst>
-                            <p:childTnLst>
-                              <p:par>
-                                <p:cTn id="9" presetID="1" presetClass="entr" presetSubtype="0" fill="hold" grpId="0" nodeType="clickEffect">
-                                  <p:stCondLst>
-                                    <p:cond delay="0"/>
-                                  </p:stCondLst>
-                                  <p:childTnLst>
-                                    <p:set>
-                                      <p:cBhvr>
-                                        <p:cTn id="10" dur="1" fill="hold">
-                                          <p:stCondLst>
-                                            <p:cond delay="0"/>
-                                          </p:stCondLst>
-                                        </p:cTn>
-                                        <p:tgtEl>
-                                          <p:spTgt spid="5">
-                                            <p:txEl>
-                                              <p:pRg st="4" end="4"/>
-                                            </p:txEl>
-                                          </p:spTgt>
-                                        </p:tgtEl>
-                                        <p:attrNameLst>
-                                          <p:attrName>style.visibility</p:attrName>
-                                        </p:attrNameLst>
-                                      </p:cBhvr>
-                                      <p:to>
-                                        <p:strVal val="visible"/>
-                                      </p:to>
-                                    </p:set>
-                                  </p:childTnLst>
-                                </p:cTn>
-                              </p:par>
-                            </p:childTnLst>
-                          </p:cTn>
-                        </p:par>
-                      </p:childTnLst>
-                    </p:cTn>
-                  </p:par>
-                  <p:par>
-                    <p:cTn id="11" fill="hold">
-                      <p:stCondLst>
-                        <p:cond delay="indefinite"/>
-                      </p:stCondLst>
-                      <p:childTnLst>
-                        <p:par>
-                          <p:cTn id="12" fill="hold">
-                            <p:stCondLst>
-                              <p:cond delay="0"/>
-                            </p:stCondLst>
-                            <p:childTnLst>
-                              <p:par>
-                                <p:cTn id="13" presetID="1" presetClass="entr" presetSubtype="0" fill="hold" grpId="0" nodeType="clickEffect">
-                                  <p:stCondLst>
-                                    <p:cond delay="0"/>
-                                  </p:stCondLst>
-                                  <p:childTnLst>
-                                    <p:set>
-                                      <p:cBhvr>
-                                        <p:cTn id="14" dur="1" fill="hold">
-                                          <p:stCondLst>
-                                            <p:cond delay="0"/>
-                                          </p:stCondLst>
-                                        </p:cTn>
-                                        <p:tgtEl>
-                                          <p:spTgt spid="5">
-                                            <p:txEl>
-                                              <p:pRg st="6" end="6"/>
-                                            </p:txEl>
-                                          </p:spTgt>
-                                        </p:tgtEl>
-                                        <p:attrNameLst>
-                                          <p:attrName>style.visibility</p:attrName>
-                                        </p:attrNameLst>
-                                      </p:cBhvr>
-                                      <p:to>
-                                        <p:strVal val="visible"/>
-                                      </p:to>
-                                    </p:set>
-                                  </p:childTnLst>
-                                </p:cTn>
-                              </p:par>
-                            </p:childTnLst>
-                          </p:cTn>
-                        </p:par>
-                      </p:childTnLst>
-                    </p:cTn>
-                  </p:par>
-                </p:childTnLst>
-              </p:cTn>
-              <p:prevCondLst>
-                <p:cond evt="onPrev" delay="0">
-                  <p:tgtEl>
-                    <p:sldTgt/>
-                  </p:tgtEl>
-                </p:cond>
-              </p:prevCondLst>
-              <p:nextCondLst>
-                <p:cond evt="onNext" delay="0">
-                  <p:tgtEl>
-                    <p:sldTgt/>
-                  </p:tgtEl>
-                </p:cond>
-              </p:nextCondLst>
-            </p:seq>
-          </p:childTnLst>
-        </p:cTn>
-      </p:par>
-    </p:tnLst>
-    <p:bldLst>
-      <p:bldP spid="5" grpId="0" uiExpand="1" build="p"/>
-    </p:bldLst>
-  </p:timing>
-</p:sld>
-</file>
-
-<file path=ppt/slides/slide49.xml><?xml version="1.0" encoding="utf-8"?>
-<p:sld xmlns:a="http://schemas.openxmlformats.org/drawingml/2006/main" xmlns:r="http://schemas.openxmlformats.org/officeDocument/2006/relationships" xmlns:p="http://schemas.openxmlformats.org/presentationml/2006/main">
-  <p:cSld>
-    <p:spTree>
-      <p:nvGrpSpPr>
-        <p:cNvPr id="1" name=""/>
-        <p:cNvGrpSpPr/>
-        <p:nvPr/>
-      </p:nvGrpSpPr>
-      <p:grpSpPr>
-        <a:xfrm>
-          <a:off x="0" y="0"/>
-          <a:ext cx="0" cy="0"/>
-          <a:chOff x="0" y="0"/>
-          <a:chExt cx="0" cy="0"/>
-        </a:xfrm>
-      </p:grpSpPr>
-      <p:sp>
-        <p:nvSpPr>
-          <p:cNvPr id="25602" name="Text Box 3"/>
-          <p:cNvSpPr txBox="1">
-            <a:spLocks noChangeArrowheads="1"/>
-          </p:cNvSpPr>
-          <p:nvPr/>
-        </p:nvSpPr>
-        <p:spPr bwMode="auto">
-          <a:xfrm>
-            <a:off x="-1981200" y="1066800"/>
-            <a:ext cx="184731" cy="341632"/>
-          </a:xfrm>
-          <a:prstGeom prst="rect">
-            <a:avLst/>
-          </a:prstGeom>
-          <a:noFill/>
-          <a:ln w="12700">
-            <a:noFill/>
-            <a:miter lim="800000"/>
-            <a:headEnd/>
-            <a:tailEnd/>
-          </a:ln>
-        </p:spPr>
-        <p:txBody>
-          <a:bodyPr wrap="none">
-            <a:spAutoFit/>
-          </a:bodyPr>
-          <a:lstStyle/>
-          <a:p>
-            <a:endParaRPr lang="en-US"/>
-          </a:p>
-        </p:txBody>
-      </p:sp>
-      <p:sp>
-        <p:nvSpPr>
-          <p:cNvPr id="6" name="Title 5"/>
-          <p:cNvSpPr>
-            <a:spLocks noGrp="1"/>
-          </p:cNvSpPr>
-          <p:nvPr>
-            <p:ph type="title"/>
-          </p:nvPr>
-        </p:nvSpPr>
-        <p:spPr/>
-        <p:txBody>
-          <a:bodyPr/>
-          <a:lstStyle/>
-          <a:p>
-            <a:r>
-              <a:rPr lang="en-US" dirty="0"/>
-              <a:t>The &lt;div&gt; tag</a:t>
-            </a:r>
-          </a:p>
-        </p:txBody>
-      </p:sp>
-      <p:sp>
-        <p:nvSpPr>
-          <p:cNvPr id="7" name="Content Placeholder 6"/>
-          <p:cNvSpPr>
-            <a:spLocks noGrp="1"/>
-          </p:cNvSpPr>
-          <p:nvPr>
-            <p:ph idx="1"/>
-          </p:nvPr>
-        </p:nvSpPr>
-        <p:spPr/>
-        <p:txBody>
-          <a:bodyPr>
-            <a:normAutofit/>
-          </a:bodyPr>
-          <a:lstStyle/>
-          <a:p>
-            <a:r>
-              <a:rPr lang="en-US" dirty="0"/>
-              <a:t>Another tag that is useful for style specifications: </a:t>
-            </a:r>
-            <a:r>
-              <a:rPr lang="en-US" sz="2800" b="1" dirty="0">
-                <a:solidFill>
-                  <a:srgbClr val="FF0000"/>
-                </a:solidFill>
-                <a:latin typeface="Courier New" pitchFamily="49" charset="0"/>
-              </a:rPr>
-              <a:t>&lt;div&gt;</a:t>
-            </a:r>
-            <a:endParaRPr lang="en-US" b="1" dirty="0">
-              <a:solidFill>
-                <a:srgbClr val="FF0000"/>
-              </a:solidFill>
-            </a:endParaRPr>
-          </a:p>
-          <a:p>
-            <a:endParaRPr lang="en-US" dirty="0"/>
-          </a:p>
-          <a:p>
-            <a:r>
-              <a:rPr lang="en-US" dirty="0"/>
-              <a:t>Used to create document sections (or </a:t>
-            </a:r>
-            <a:r>
-              <a:rPr lang="en-US" b="1" dirty="0"/>
-              <a:t>divisions</a:t>
-            </a:r>
-            <a:r>
-              <a:rPr lang="en-US" dirty="0"/>
-              <a:t>) for which style can be specified</a:t>
-            </a:r>
-          </a:p>
-          <a:p>
-            <a:endParaRPr lang="en-US" dirty="0"/>
-          </a:p>
-        </p:txBody>
-      </p:sp>
-    </p:spTree>
-    <p:extLst>
-      <p:ext uri="{BB962C8B-B14F-4D97-AF65-F5344CB8AC3E}">
-        <p14:creationId xmlns:p14="http://schemas.microsoft.com/office/powerpoint/2010/main" val="3399927582"/>
-      </p:ext>
-    </p:extLst>
-  </p:cSld>
-  <p:clrMapOvr>
-    <a:masterClrMapping/>
-  </p:clrMapOvr>
-  <p:timing>
-    <p:tnLst>
-      <p:par>
-        <p:cTn id="1" dur="indefinite" restart="never" nodeType="tmRoot">
-          <p:childTnLst>
-            <p:seq concurrent="1" nextAc="seek">
-              <p:cTn id="2" dur="indefinite" nodeType="mainSeq">
-                <p:childTnLst>
-                  <p:par>
-                    <p:cTn id="3" fill="hold">
-                      <p:stCondLst>
-                        <p:cond delay="indefinite"/>
-                      </p:stCondLst>
-                      <p:childTnLst>
-                        <p:par>
-                          <p:cTn id="4" fill="hold">
-                            <p:stCondLst>
-                              <p:cond delay="0"/>
-                            </p:stCondLst>
-                            <p:childTnLst>
-                              <p:par>
-                                <p:cTn id="5" presetID="1" presetClass="entr" presetSubtype="0" fill="hold" grpId="0" nodeType="clickEffect">
-                                  <p:stCondLst>
-                                    <p:cond delay="0"/>
-                                  </p:stCondLst>
-                                  <p:childTnLst>
-                                    <p:set>
-                                      <p:cBhvr>
-                                        <p:cTn id="6" dur="1" fill="hold">
-                                          <p:stCondLst>
-                                            <p:cond delay="0"/>
-                                          </p:stCondLst>
-                                        </p:cTn>
-                                        <p:tgtEl>
-                                          <p:spTgt spid="7">
-                                            <p:txEl>
-                                              <p:pRg st="2" end="2"/>
-                                            </p:txEl>
-                                          </p:spTgt>
-                                        </p:tgtEl>
-                                        <p:attrNameLst>
-                                          <p:attrName>style.visibility</p:attrName>
-                                        </p:attrNameLst>
-                                      </p:cBhvr>
-                                      <p:to>
-                                        <p:strVal val="visible"/>
-                                      </p:to>
-                                    </p:set>
-                                  </p:childTnLst>
-                                </p:cTn>
-                              </p:par>
-                            </p:childTnLst>
-                          </p:cTn>
-                        </p:par>
-                      </p:childTnLst>
-                    </p:cTn>
-                  </p:par>
-                </p:childTnLst>
-              </p:cTn>
-              <p:prevCondLst>
-                <p:cond evt="onPrev" delay="0">
-                  <p:tgtEl>
-                    <p:sldTgt/>
-                  </p:tgtEl>
-                </p:cond>
-              </p:prevCondLst>
-              <p:nextCondLst>
-                <p:cond evt="onNext" delay="0">
-                  <p:tgtEl>
-                    <p:sldTgt/>
-                  </p:tgtEl>
-                </p:cond>
-              </p:nextCondLst>
-            </p:seq>
-          </p:childTnLst>
-        </p:cTn>
-      </p:par>
-    </p:tnLst>
-    <p:bldLst>
-      <p:bldP spid="7" grpId="0" uiExpand="1" build="p"/>
-    </p:bldLst>
-  </p:timing>
 </p:sld>
 </file>
 
@@ -27449,6 +27205,586 @@
             <a:spLocks noGrp="1"/>
           </p:cNvSpPr>
           <p:nvPr>
+            <p:ph type="title"/>
+          </p:nvPr>
+        </p:nvSpPr>
+        <p:spPr/>
+        <p:txBody>
+          <a:bodyPr/>
+          <a:lstStyle/>
+          <a:p>
+            <a:r>
+              <a:rPr lang="en-US" dirty="0"/>
+              <a:t>The &lt;span&gt;  tag</a:t>
+            </a:r>
+          </a:p>
+        </p:txBody>
+      </p:sp>
+      <p:sp>
+        <p:nvSpPr>
+          <p:cNvPr id="5" name="Content Placeholder 4"/>
+          <p:cNvSpPr>
+            <a:spLocks noGrp="1"/>
+          </p:cNvSpPr>
+          <p:nvPr>
+            <p:ph idx="1"/>
+          </p:nvPr>
+        </p:nvSpPr>
+        <p:spPr>
+          <a:xfrm>
+            <a:off x="685800" y="1219200"/>
+            <a:ext cx="7772400" cy="4495800"/>
+          </a:xfrm>
+        </p:spPr>
+        <p:txBody>
+          <a:bodyPr>
+            <a:normAutofit/>
+          </a:bodyPr>
+          <a:lstStyle/>
+          <a:p>
+            <a:r>
+              <a:rPr lang="en-US" sz="2300" dirty="0"/>
+              <a:t>One problem with the font properties is that they apply to whole elements, which are often too large</a:t>
+            </a:r>
+          </a:p>
+          <a:p>
+            <a:endParaRPr lang="en-US" sz="2300" dirty="0"/>
+          </a:p>
+          <a:p>
+            <a:r>
+              <a:rPr lang="en-US" sz="2300" dirty="0"/>
+              <a:t>Solution: a new tag to define an element in the content of a larger element - </a:t>
+            </a:r>
+            <a:r>
+              <a:rPr lang="en-US" sz="2300" b="1" dirty="0">
+                <a:solidFill>
+                  <a:srgbClr val="FF0000"/>
+                </a:solidFill>
+                <a:latin typeface="Courier New" pitchFamily="49" charset="0"/>
+              </a:rPr>
+              <a:t>&lt;span&gt;</a:t>
+            </a:r>
+            <a:endParaRPr lang="en-US" sz="2300" b="1" dirty="0">
+              <a:solidFill>
+                <a:srgbClr val="FF0000"/>
+              </a:solidFill>
+            </a:endParaRPr>
+          </a:p>
+          <a:p>
+            <a:endParaRPr lang="en-US" sz="2300" dirty="0"/>
+          </a:p>
+          <a:p>
+            <a:r>
+              <a:rPr lang="en-US" sz="2300" dirty="0"/>
+              <a:t>The default meaning of </a:t>
+            </a:r>
+            <a:r>
+              <a:rPr lang="en-US" sz="2300" dirty="0">
+                <a:latin typeface="Courier New" pitchFamily="49" charset="0"/>
+              </a:rPr>
+              <a:t>&lt;span&gt;</a:t>
+            </a:r>
+            <a:r>
+              <a:rPr lang="en-US" sz="2300" dirty="0"/>
+              <a:t> is to leave the content as it is</a:t>
+            </a:r>
+          </a:p>
+          <a:p>
+            <a:endParaRPr lang="en-US" sz="2300" dirty="0"/>
+          </a:p>
+          <a:p>
+            <a:r>
+              <a:rPr lang="en-US" sz="2300" dirty="0"/>
+              <a:t>The </a:t>
+            </a:r>
+            <a:r>
+              <a:rPr lang="en-US" sz="2300" dirty="0">
+                <a:latin typeface="Courier New" pitchFamily="49" charset="0"/>
+              </a:rPr>
+              <a:t>&lt;span&gt;</a:t>
+            </a:r>
+            <a:r>
+              <a:rPr lang="en-US" sz="2300" dirty="0"/>
+              <a:t> tag can be nested and have </a:t>
+            </a:r>
+            <a:r>
+              <a:rPr lang="en-US" sz="2300" dirty="0">
+                <a:latin typeface="Courier New" pitchFamily="49" charset="0"/>
+              </a:rPr>
+              <a:t>id</a:t>
+            </a:r>
+            <a:r>
+              <a:rPr lang="en-US" sz="2300" dirty="0"/>
+              <a:t> and </a:t>
+            </a:r>
+            <a:r>
+              <a:rPr lang="en-US" sz="2300" dirty="0">
+                <a:latin typeface="Courier New" pitchFamily="49" charset="0"/>
+              </a:rPr>
+              <a:t>class</a:t>
+            </a:r>
+            <a:r>
+              <a:rPr lang="en-US" sz="2300" dirty="0"/>
+              <a:t>   attributes</a:t>
+            </a:r>
+          </a:p>
+          <a:p>
+            <a:endParaRPr lang="en-US" dirty="0"/>
+          </a:p>
+          <a:p>
+            <a:endParaRPr lang="en-US" dirty="0"/>
+          </a:p>
+          <a:p>
+            <a:endParaRPr lang="en-US" dirty="0">
+              <a:latin typeface="Courier New" pitchFamily="49" charset="0"/>
+              <a:cs typeface="Courier New" pitchFamily="49" charset="0"/>
+            </a:endParaRPr>
+          </a:p>
+        </p:txBody>
+      </p:sp>
+    </p:spTree>
+    <p:extLst>
+      <p:ext uri="{BB962C8B-B14F-4D97-AF65-F5344CB8AC3E}">
+        <p14:creationId xmlns:p14="http://schemas.microsoft.com/office/powerpoint/2010/main" val="253971723"/>
+      </p:ext>
+    </p:extLst>
+  </p:cSld>
+  <p:clrMapOvr>
+    <a:masterClrMapping/>
+  </p:clrMapOvr>
+  <p:timing>
+    <p:tnLst>
+      <p:par>
+        <p:cTn id="1" dur="indefinite" restart="never" nodeType="tmRoot">
+          <p:childTnLst>
+            <p:seq concurrent="1" nextAc="seek">
+              <p:cTn id="2" dur="indefinite" nodeType="mainSeq">
+                <p:childTnLst>
+                  <p:par>
+                    <p:cTn id="3" fill="hold">
+                      <p:stCondLst>
+                        <p:cond delay="indefinite"/>
+                      </p:stCondLst>
+                      <p:childTnLst>
+                        <p:par>
+                          <p:cTn id="4" fill="hold">
+                            <p:stCondLst>
+                              <p:cond delay="0"/>
+                            </p:stCondLst>
+                            <p:childTnLst>
+                              <p:par>
+                                <p:cTn id="5" presetID="1" presetClass="entr" presetSubtype="0" fill="hold" grpId="0" nodeType="clickEffect">
+                                  <p:stCondLst>
+                                    <p:cond delay="0"/>
+                                  </p:stCondLst>
+                                  <p:childTnLst>
+                                    <p:set>
+                                      <p:cBhvr>
+                                        <p:cTn id="6" dur="1" fill="hold">
+                                          <p:stCondLst>
+                                            <p:cond delay="0"/>
+                                          </p:stCondLst>
+                                        </p:cTn>
+                                        <p:tgtEl>
+                                          <p:spTgt spid="5">
+                                            <p:txEl>
+                                              <p:pRg st="2" end="2"/>
+                                            </p:txEl>
+                                          </p:spTgt>
+                                        </p:tgtEl>
+                                        <p:attrNameLst>
+                                          <p:attrName>style.visibility</p:attrName>
+                                        </p:attrNameLst>
+                                      </p:cBhvr>
+                                      <p:to>
+                                        <p:strVal val="visible"/>
+                                      </p:to>
+                                    </p:set>
+                                  </p:childTnLst>
+                                </p:cTn>
+                              </p:par>
+                            </p:childTnLst>
+                          </p:cTn>
+                        </p:par>
+                      </p:childTnLst>
+                    </p:cTn>
+                  </p:par>
+                  <p:par>
+                    <p:cTn id="7" fill="hold">
+                      <p:stCondLst>
+                        <p:cond delay="indefinite"/>
+                      </p:stCondLst>
+                      <p:childTnLst>
+                        <p:par>
+                          <p:cTn id="8" fill="hold">
+                            <p:stCondLst>
+                              <p:cond delay="0"/>
+                            </p:stCondLst>
+                            <p:childTnLst>
+                              <p:par>
+                                <p:cTn id="9" presetID="1" presetClass="entr" presetSubtype="0" fill="hold" grpId="0" nodeType="clickEffect">
+                                  <p:stCondLst>
+                                    <p:cond delay="0"/>
+                                  </p:stCondLst>
+                                  <p:childTnLst>
+                                    <p:set>
+                                      <p:cBhvr>
+                                        <p:cTn id="10" dur="1" fill="hold">
+                                          <p:stCondLst>
+                                            <p:cond delay="0"/>
+                                          </p:stCondLst>
+                                        </p:cTn>
+                                        <p:tgtEl>
+                                          <p:spTgt spid="5">
+                                            <p:txEl>
+                                              <p:pRg st="4" end="4"/>
+                                            </p:txEl>
+                                          </p:spTgt>
+                                        </p:tgtEl>
+                                        <p:attrNameLst>
+                                          <p:attrName>style.visibility</p:attrName>
+                                        </p:attrNameLst>
+                                      </p:cBhvr>
+                                      <p:to>
+                                        <p:strVal val="visible"/>
+                                      </p:to>
+                                    </p:set>
+                                  </p:childTnLst>
+                                </p:cTn>
+                              </p:par>
+                            </p:childTnLst>
+                          </p:cTn>
+                        </p:par>
+                      </p:childTnLst>
+                    </p:cTn>
+                  </p:par>
+                  <p:par>
+                    <p:cTn id="11" fill="hold">
+                      <p:stCondLst>
+                        <p:cond delay="indefinite"/>
+                      </p:stCondLst>
+                      <p:childTnLst>
+                        <p:par>
+                          <p:cTn id="12" fill="hold">
+                            <p:stCondLst>
+                              <p:cond delay="0"/>
+                            </p:stCondLst>
+                            <p:childTnLst>
+                              <p:par>
+                                <p:cTn id="13" presetID="1" presetClass="entr" presetSubtype="0" fill="hold" grpId="0" nodeType="clickEffect">
+                                  <p:stCondLst>
+                                    <p:cond delay="0"/>
+                                  </p:stCondLst>
+                                  <p:childTnLst>
+                                    <p:set>
+                                      <p:cBhvr>
+                                        <p:cTn id="14" dur="1" fill="hold">
+                                          <p:stCondLst>
+                                            <p:cond delay="0"/>
+                                          </p:stCondLst>
+                                        </p:cTn>
+                                        <p:tgtEl>
+                                          <p:spTgt spid="5">
+                                            <p:txEl>
+                                              <p:pRg st="6" end="6"/>
+                                            </p:txEl>
+                                          </p:spTgt>
+                                        </p:tgtEl>
+                                        <p:attrNameLst>
+                                          <p:attrName>style.visibility</p:attrName>
+                                        </p:attrNameLst>
+                                      </p:cBhvr>
+                                      <p:to>
+                                        <p:strVal val="visible"/>
+                                      </p:to>
+                                    </p:set>
+                                  </p:childTnLst>
+                                </p:cTn>
+                              </p:par>
+                            </p:childTnLst>
+                          </p:cTn>
+                        </p:par>
+                      </p:childTnLst>
+                    </p:cTn>
+                  </p:par>
+                </p:childTnLst>
+              </p:cTn>
+              <p:prevCondLst>
+                <p:cond evt="onPrev" delay="0">
+                  <p:tgtEl>
+                    <p:sldTgt/>
+                  </p:tgtEl>
+                </p:cond>
+              </p:prevCondLst>
+              <p:nextCondLst>
+                <p:cond evt="onNext" delay="0">
+                  <p:tgtEl>
+                    <p:sldTgt/>
+                  </p:tgtEl>
+                </p:cond>
+              </p:nextCondLst>
+            </p:seq>
+          </p:childTnLst>
+        </p:cTn>
+      </p:par>
+    </p:tnLst>
+    <p:bldLst>
+      <p:bldP spid="5" grpId="0" uiExpand="1" build="p"/>
+    </p:bldLst>
+  </p:timing>
+</p:sld>
+</file>
+
+<file path=ppt/slides/slide51.xml><?xml version="1.0" encoding="utf-8"?>
+<p:sld xmlns:a="http://schemas.openxmlformats.org/drawingml/2006/main" xmlns:r="http://schemas.openxmlformats.org/officeDocument/2006/relationships" xmlns:p="http://schemas.openxmlformats.org/presentationml/2006/main">
+  <p:cSld>
+    <p:spTree>
+      <p:nvGrpSpPr>
+        <p:cNvPr id="1" name=""/>
+        <p:cNvGrpSpPr/>
+        <p:nvPr/>
+      </p:nvGrpSpPr>
+      <p:grpSpPr>
+        <a:xfrm>
+          <a:off x="0" y="0"/>
+          <a:ext cx="0" cy="0"/>
+          <a:chOff x="0" y="0"/>
+          <a:chExt cx="0" cy="0"/>
+        </a:xfrm>
+      </p:grpSpPr>
+      <p:sp>
+        <p:nvSpPr>
+          <p:cNvPr id="25602" name="Text Box 3"/>
+          <p:cNvSpPr txBox="1">
+            <a:spLocks noChangeArrowheads="1"/>
+          </p:cNvSpPr>
+          <p:nvPr/>
+        </p:nvSpPr>
+        <p:spPr bwMode="auto">
+          <a:xfrm>
+            <a:off x="-1981200" y="1066800"/>
+            <a:ext cx="184731" cy="341632"/>
+          </a:xfrm>
+          <a:prstGeom prst="rect">
+            <a:avLst/>
+          </a:prstGeom>
+          <a:noFill/>
+          <a:ln w="12700">
+            <a:noFill/>
+            <a:miter lim="800000"/>
+            <a:headEnd/>
+            <a:tailEnd/>
+          </a:ln>
+        </p:spPr>
+        <p:txBody>
+          <a:bodyPr wrap="none">
+            <a:spAutoFit/>
+          </a:bodyPr>
+          <a:lstStyle/>
+          <a:p>
+            <a:endParaRPr lang="en-US"/>
+          </a:p>
+        </p:txBody>
+      </p:sp>
+      <p:sp>
+        <p:nvSpPr>
+          <p:cNvPr id="6" name="Title 5"/>
+          <p:cNvSpPr>
+            <a:spLocks noGrp="1"/>
+          </p:cNvSpPr>
+          <p:nvPr>
+            <p:ph type="title"/>
+          </p:nvPr>
+        </p:nvSpPr>
+        <p:spPr/>
+        <p:txBody>
+          <a:bodyPr/>
+          <a:lstStyle/>
+          <a:p>
+            <a:r>
+              <a:rPr lang="en-US" dirty="0"/>
+              <a:t>The &lt;div&gt; tag</a:t>
+            </a:r>
+          </a:p>
+        </p:txBody>
+      </p:sp>
+      <p:sp>
+        <p:nvSpPr>
+          <p:cNvPr id="7" name="Content Placeholder 6"/>
+          <p:cNvSpPr>
+            <a:spLocks noGrp="1"/>
+          </p:cNvSpPr>
+          <p:nvPr>
+            <p:ph idx="1"/>
+          </p:nvPr>
+        </p:nvSpPr>
+        <p:spPr/>
+        <p:txBody>
+          <a:bodyPr>
+            <a:normAutofit/>
+          </a:bodyPr>
+          <a:lstStyle/>
+          <a:p>
+            <a:r>
+              <a:rPr lang="en-US" dirty="0"/>
+              <a:t>Another tag that is useful for style specifications: </a:t>
+            </a:r>
+            <a:r>
+              <a:rPr lang="en-US" sz="2800" b="1" dirty="0">
+                <a:solidFill>
+                  <a:srgbClr val="FF0000"/>
+                </a:solidFill>
+                <a:latin typeface="Courier New" pitchFamily="49" charset="0"/>
+              </a:rPr>
+              <a:t>&lt;div&gt;</a:t>
+            </a:r>
+            <a:endParaRPr lang="en-US" b="1" dirty="0">
+              <a:solidFill>
+                <a:srgbClr val="FF0000"/>
+              </a:solidFill>
+            </a:endParaRPr>
+          </a:p>
+          <a:p>
+            <a:endParaRPr lang="en-US" dirty="0"/>
+          </a:p>
+          <a:p>
+            <a:r>
+              <a:rPr lang="en-US" dirty="0"/>
+              <a:t>Used to create document sections (or </a:t>
+            </a:r>
+            <a:r>
+              <a:rPr lang="en-US" b="1" dirty="0"/>
+              <a:t>divisions</a:t>
+            </a:r>
+            <a:r>
+              <a:rPr lang="en-US" dirty="0"/>
+              <a:t>) for which style can be specified</a:t>
+            </a:r>
+          </a:p>
+          <a:p>
+            <a:endParaRPr lang="en-US" dirty="0"/>
+          </a:p>
+        </p:txBody>
+      </p:sp>
+    </p:spTree>
+    <p:extLst>
+      <p:ext uri="{BB962C8B-B14F-4D97-AF65-F5344CB8AC3E}">
+        <p14:creationId xmlns:p14="http://schemas.microsoft.com/office/powerpoint/2010/main" val="3399927582"/>
+      </p:ext>
+    </p:extLst>
+  </p:cSld>
+  <p:clrMapOvr>
+    <a:masterClrMapping/>
+  </p:clrMapOvr>
+  <p:timing>
+    <p:tnLst>
+      <p:par>
+        <p:cTn id="1" dur="indefinite" restart="never" nodeType="tmRoot">
+          <p:childTnLst>
+            <p:seq concurrent="1" nextAc="seek">
+              <p:cTn id="2" dur="indefinite" nodeType="mainSeq">
+                <p:childTnLst>
+                  <p:par>
+                    <p:cTn id="3" fill="hold">
+                      <p:stCondLst>
+                        <p:cond delay="indefinite"/>
+                      </p:stCondLst>
+                      <p:childTnLst>
+                        <p:par>
+                          <p:cTn id="4" fill="hold">
+                            <p:stCondLst>
+                              <p:cond delay="0"/>
+                            </p:stCondLst>
+                            <p:childTnLst>
+                              <p:par>
+                                <p:cTn id="5" presetID="1" presetClass="entr" presetSubtype="0" fill="hold" grpId="0" nodeType="clickEffect">
+                                  <p:stCondLst>
+                                    <p:cond delay="0"/>
+                                  </p:stCondLst>
+                                  <p:childTnLst>
+                                    <p:set>
+                                      <p:cBhvr>
+                                        <p:cTn id="6" dur="1" fill="hold">
+                                          <p:stCondLst>
+                                            <p:cond delay="0"/>
+                                          </p:stCondLst>
+                                        </p:cTn>
+                                        <p:tgtEl>
+                                          <p:spTgt spid="7">
+                                            <p:txEl>
+                                              <p:pRg st="2" end="2"/>
+                                            </p:txEl>
+                                          </p:spTgt>
+                                        </p:tgtEl>
+                                        <p:attrNameLst>
+                                          <p:attrName>style.visibility</p:attrName>
+                                        </p:attrNameLst>
+                                      </p:cBhvr>
+                                      <p:to>
+                                        <p:strVal val="visible"/>
+                                      </p:to>
+                                    </p:set>
+                                  </p:childTnLst>
+                                </p:cTn>
+                              </p:par>
+                            </p:childTnLst>
+                          </p:cTn>
+                        </p:par>
+                      </p:childTnLst>
+                    </p:cTn>
+                  </p:par>
+                </p:childTnLst>
+              </p:cTn>
+              <p:prevCondLst>
+                <p:cond evt="onPrev" delay="0">
+                  <p:tgtEl>
+                    <p:sldTgt/>
+                  </p:tgtEl>
+                </p:cond>
+              </p:prevCondLst>
+              <p:nextCondLst>
+                <p:cond evt="onNext" delay="0">
+                  <p:tgtEl>
+                    <p:sldTgt/>
+                  </p:tgtEl>
+                </p:cond>
+              </p:nextCondLst>
+            </p:seq>
+          </p:childTnLst>
+        </p:cTn>
+      </p:par>
+    </p:tnLst>
+    <p:bldLst>
+      <p:bldP spid="7" grpId="0" uiExpand="1" build="p"/>
+    </p:bldLst>
+  </p:timing>
+</p:sld>
+</file>
+
+<file path=ppt/slides/slide52.xml><?xml version="1.0" encoding="utf-8"?>
+<p:sld xmlns:a="http://schemas.openxmlformats.org/drawingml/2006/main" xmlns:r="http://schemas.openxmlformats.org/officeDocument/2006/relationships" xmlns:p="http://schemas.openxmlformats.org/presentationml/2006/main">
+  <p:cSld>
+    <p:spTree>
+      <p:nvGrpSpPr>
+        <p:cNvPr id="1" name=""/>
+        <p:cNvGrpSpPr/>
+        <p:nvPr/>
+      </p:nvGrpSpPr>
+      <p:grpSpPr>
+        <a:xfrm>
+          <a:off x="0" y="0"/>
+          <a:ext cx="0" cy="0"/>
+          <a:chOff x="0" y="0"/>
+          <a:chExt cx="0" cy="0"/>
+        </a:xfrm>
+      </p:grpSpPr>
+      <p:sp>
+        <p:nvSpPr>
+          <p:cNvPr id="4" name="Title 3"/>
+          <p:cNvSpPr>
+            <a:spLocks noGrp="1"/>
+          </p:cNvSpPr>
+          <p:nvPr>
             <p:ph type="ctrTitle"/>
           </p:nvPr>
         </p:nvSpPr>
@@ -27477,7 +27813,7 @@
 </p:sld>
 </file>
 
-<file path=ppt/slides/slide51.xml><?xml version="1.0" encoding="utf-8"?>
+<file path=ppt/slides/slide53.xml><?xml version="1.0" encoding="utf-8"?>
 <p:sld xmlns:a="http://schemas.openxmlformats.org/drawingml/2006/main" xmlns:r="http://schemas.openxmlformats.org/officeDocument/2006/relationships" xmlns:p="http://schemas.openxmlformats.org/presentationml/2006/main">
   <p:cSld>
     <p:spTree>
@@ -27886,7 +28222,7 @@
 </p:sld>
 </file>
 
-<file path=ppt/slides/slide52.xml><?xml version="1.0" encoding="utf-8"?>
+<file path=ppt/slides/slide54.xml><?xml version="1.0" encoding="utf-8"?>
 <p:sld xmlns:a="http://schemas.openxmlformats.org/drawingml/2006/main" xmlns:r="http://schemas.openxmlformats.org/officeDocument/2006/relationships" xmlns:p="http://schemas.openxmlformats.org/presentationml/2006/main">
   <p:cSld>
     <p:spTree>
@@ -28305,7 +28641,7 @@
 </p:sld>
 </file>
 
-<file path=ppt/slides/slide53.xml><?xml version="1.0" encoding="utf-8"?>
+<file path=ppt/slides/slide55.xml><?xml version="1.0" encoding="utf-8"?>
 <p:sld xmlns:a="http://schemas.openxmlformats.org/drawingml/2006/main" xmlns:r="http://schemas.openxmlformats.org/officeDocument/2006/relationships" xmlns:p="http://schemas.openxmlformats.org/presentationml/2006/main">
   <p:cSld>
     <p:spTree>
@@ -28863,7 +29199,7 @@
 </p:sld>
 </file>
 
-<file path=ppt/slides/slide54.xml><?xml version="1.0" encoding="utf-8"?>
+<file path=ppt/slides/slide56.xml><?xml version="1.0" encoding="utf-8"?>
 <p:sld xmlns:a="http://schemas.openxmlformats.org/drawingml/2006/main" xmlns:r="http://schemas.openxmlformats.org/officeDocument/2006/relationships" xmlns:p="http://schemas.openxmlformats.org/presentationml/2006/main">
   <p:cSld>
     <p:spTree>
@@ -29312,7 +29648,7 @@
 </p:sld>
 </file>
 
-<file path=ppt/slides/slide55.xml><?xml version="1.0" encoding="utf-8"?>
+<file path=ppt/slides/slide57.xml><?xml version="1.0" encoding="utf-8"?>
 <p:sld xmlns:a="http://schemas.openxmlformats.org/drawingml/2006/main" xmlns:r="http://schemas.openxmlformats.org/officeDocument/2006/relationships" xmlns:p="http://schemas.openxmlformats.org/presentationml/2006/main">
   <p:cSld>
     <p:spTree>

</xml_diff>